<commit_message>
diapo module 1 tenté
</commit_message>
<xml_diff>
--- a/PROJET 1 UE 1 diapositive.pptx
+++ b/PROJET 1 UE 1 diapositive.pptx
@@ -4698,28 +4698,119 @@
           </a:p>
         </p:txBody>
       </p:sp>
-      <p:sp>
-        <p:nvSpPr>
-          <p:cNvPr id="3" name="Espace réservé du contenu 2">
-            <a:extLst>
-              <a:ext uri="{FF2B5EF4-FFF2-40B4-BE49-F238E27FC236}">
-                <a16:creationId xmlns:a16="http://schemas.microsoft.com/office/drawing/2014/main" id="{63D12E1F-550B-4D54-B45F-3F1B7FBEECC4}"/>
-              </a:ext>
-            </a:extLst>
-          </p:cNvPr>
-          <p:cNvSpPr>
-            <a:spLocks noGrp="1"/>
-          </p:cNvSpPr>
+      <p:pic>
+        <p:nvPicPr>
+          <p:cNvPr id="5" name="Espace réservé du contenu 4">
+            <a:extLst>
+              <a:ext uri="{FF2B5EF4-FFF2-40B4-BE49-F238E27FC236}">
+                <a16:creationId xmlns:a16="http://schemas.microsoft.com/office/drawing/2014/main" id="{1E9EA255-BDA7-4EFA-A18D-4BD344CB30CC}"/>
+              </a:ext>
+            </a:extLst>
+          </p:cNvPr>
+          <p:cNvPicPr>
+            <a:picLocks noGrp="1" noChangeAspect="1"/>
+          </p:cNvPicPr>
           <p:nvPr>
             <p:ph idx="1"/>
           </p:nvPr>
-        </p:nvSpPr>
-        <p:spPr/>
-        <p:txBody>
-          <a:bodyPr/>
-          <a:lstStyle/>
-          <a:p>
-            <a:endParaRPr lang="fr-FR"/>
+        </p:nvPicPr>
+        <p:blipFill>
+          <a:blip r:embed="rId2">
+            <a:extLst>
+              <a:ext uri="{28A0092B-C50C-407E-A947-70E740481C1C}">
+                <a14:useLocalDpi xmlns:a14="http://schemas.microsoft.com/office/drawing/2010/main" val="0"/>
+              </a:ext>
+            </a:extLst>
+          </a:blip>
+          <a:stretch>
+            <a:fillRect/>
+          </a:stretch>
+        </p:blipFill>
+        <p:spPr>
+          <a:xfrm>
+            <a:off x="7591148" y="1806098"/>
+            <a:ext cx="2866748" cy="4439040"/>
+          </a:xfrm>
+        </p:spPr>
+      </p:pic>
+      <p:sp>
+        <p:nvSpPr>
+          <p:cNvPr id="6" name="ZoneTexte 5">
+            <a:extLst>
+              <a:ext uri="{FF2B5EF4-FFF2-40B4-BE49-F238E27FC236}">
+                <a16:creationId xmlns:a16="http://schemas.microsoft.com/office/drawing/2014/main" id="{B726EDAA-0B35-46F2-8E17-CBA3E2CBB965}"/>
+              </a:ext>
+            </a:extLst>
+          </p:cNvPr>
+          <p:cNvSpPr txBox="1"/>
+          <p:nvPr/>
+        </p:nvSpPr>
+        <p:spPr>
+          <a:xfrm>
+            <a:off x="7625918" y="1242874"/>
+            <a:ext cx="2840855" cy="646331"/>
+          </a:xfrm>
+          <a:prstGeom prst="rect">
+            <a:avLst/>
+          </a:prstGeom>
+          <a:noFill/>
+        </p:spPr>
+        <p:txBody>
+          <a:bodyPr wrap="square" rtlCol="0">
+            <a:spAutoFit/>
+          </a:bodyPr>
+          <a:lstStyle/>
+          <a:p>
+            <a:r>
+              <a:rPr lang="fr-FR" dirty="0"/>
+              <a:t>Code </a:t>
+            </a:r>
+            <a:r>
+              <a:rPr lang="fr-FR" dirty="0" err="1"/>
+              <a:t>arduino</a:t>
+            </a:r>
+            <a:endParaRPr lang="fr-FR" dirty="0"/>
+          </a:p>
+          <a:p>
+            <a:endParaRPr lang="fr-FR" dirty="0"/>
+          </a:p>
+        </p:txBody>
+      </p:sp>
+      <p:sp>
+        <p:nvSpPr>
+          <p:cNvPr id="7" name="ZoneTexte 6">
+            <a:extLst>
+              <a:ext uri="{FF2B5EF4-FFF2-40B4-BE49-F238E27FC236}">
+                <a16:creationId xmlns:a16="http://schemas.microsoft.com/office/drawing/2014/main" id="{0B55CE87-B3E6-4D8A-B81A-C8A53C4DA052}"/>
+              </a:ext>
+            </a:extLst>
+          </p:cNvPr>
+          <p:cNvSpPr txBox="1"/>
+          <p:nvPr/>
+        </p:nvSpPr>
+        <p:spPr>
+          <a:xfrm>
+            <a:off x="1216241" y="1393794"/>
+            <a:ext cx="2866748" cy="646331"/>
+          </a:xfrm>
+          <a:prstGeom prst="rect">
+            <a:avLst/>
+          </a:prstGeom>
+          <a:noFill/>
+        </p:spPr>
+        <p:txBody>
+          <a:bodyPr wrap="square" rtlCol="0">
+            <a:spAutoFit/>
+          </a:bodyPr>
+          <a:lstStyle/>
+          <a:p>
+            <a:r>
+              <a:rPr lang="fr-FR" dirty="0"/>
+              <a:t>Montage</a:t>
+            </a:r>
+          </a:p>
+          <a:p>
+            <a:endParaRPr lang="fr-FR" dirty="0"/>
           </a:p>
         </p:txBody>
       </p:sp>
@@ -4789,10 +4880,10 @@
       </p:sp>
       <p:pic>
         <p:nvPicPr>
-          <p:cNvPr id="6" name="Image 5">
-            <a:extLst>
-              <a:ext uri="{FF2B5EF4-FFF2-40B4-BE49-F238E27FC236}">
-                <a16:creationId xmlns:a16="http://schemas.microsoft.com/office/drawing/2014/main" id="{ED13BB49-9DF0-46D8-AF37-DC2E4D29EB16}"/>
+          <p:cNvPr id="4" name="Image 3">
+            <a:extLst>
+              <a:ext uri="{FF2B5EF4-FFF2-40B4-BE49-F238E27FC236}">
+                <a16:creationId xmlns:a16="http://schemas.microsoft.com/office/drawing/2014/main" id="{96E93A0F-CBAA-4173-BCEE-882C17BD8500}"/>
               </a:ext>
             </a:extLst>
           </p:cNvPr>
@@ -4815,8 +4906,8 @@
         </p:blipFill>
         <p:spPr>
           <a:xfrm>
-            <a:off x="1414842" y="1380744"/>
-            <a:ext cx="9767324" cy="5221632"/>
+            <a:off x="1238497" y="1376057"/>
+            <a:ext cx="9947036" cy="5317706"/>
           </a:xfrm>
           <a:prstGeom prst="rect">
             <a:avLst/>

</xml_diff>

<commit_message>
Modification style du diapo
</commit_message>
<xml_diff>
--- a/PROJET 1 UE 1 diapositive.pptx
+++ b/PROJET 1 UE 1 diapositive.pptx
@@ -2764,25 +2764,25 @@
         <a:gradFill flip="none" rotWithShape="1">
           <a:gsLst>
             <a:gs pos="0">
-              <a:schemeClr val="accent2">
+              <a:schemeClr val="accent1">
                 <a:lumMod val="20000"/>
                 <a:lumOff val="80000"/>
               </a:schemeClr>
             </a:gs>
             <a:gs pos="74000">
-              <a:schemeClr val="accent2">
+              <a:schemeClr val="accent1">
                 <a:lumMod val="60000"/>
                 <a:lumOff val="40000"/>
               </a:schemeClr>
             </a:gs>
             <a:gs pos="83000">
-              <a:schemeClr val="accent2">
+              <a:schemeClr val="accent1">
                 <a:lumMod val="60000"/>
                 <a:lumOff val="40000"/>
               </a:schemeClr>
             </a:gs>
             <a:gs pos="100000">
-              <a:schemeClr val="accent2">
+              <a:schemeClr val="accent1">
                 <a:lumMod val="40000"/>
                 <a:lumOff val="60000"/>
               </a:schemeClr>
@@ -3387,9 +3387,16 @@
             <p:ph type="ctrTitle"/>
           </p:nvPr>
         </p:nvSpPr>
-        <p:spPr/>
-        <p:txBody>
-          <a:bodyPr/>
+        <p:spPr>
+          <a:xfrm>
+            <a:off x="1524000" y="1933575"/>
+            <a:ext cx="9144000" cy="1576388"/>
+          </a:xfrm>
+        </p:spPr>
+        <p:txBody>
+          <a:bodyPr>
+            <a:normAutofit fontScale="90000"/>
+          </a:bodyPr>
           <a:lstStyle/>
           <a:p>
             <a:r>
@@ -3397,8 +3404,25 @@
                 <a:latin typeface="Cambria Math" panose="02040503050406030204" pitchFamily="18" charset="0"/>
                 <a:ea typeface="Cambria Math" panose="02040503050406030204" pitchFamily="18" charset="0"/>
               </a:rPr>
-              <a:t>PROJET 1 UE 1</a:t>
-            </a:r>
+              <a:t>Unité d’Enseignement  1</a:t>
+            </a:r>
+            <a:br>
+              <a:rPr lang="fr-FR" dirty="0">
+                <a:latin typeface="Cambria Math" panose="02040503050406030204" pitchFamily="18" charset="0"/>
+                <a:ea typeface="Cambria Math" panose="02040503050406030204" pitchFamily="18" charset="0"/>
+              </a:rPr>
+            </a:br>
+            <a:r>
+              <a:rPr lang="fr-FR" sz="4900" dirty="0">
+                <a:latin typeface="Cambria Math" panose="02040503050406030204" pitchFamily="18" charset="0"/>
+                <a:ea typeface="Cambria Math" panose="02040503050406030204" pitchFamily="18" charset="0"/>
+              </a:rPr>
+              <a:t>Projet n°1</a:t>
+            </a:r>
+            <a:endParaRPr lang="fr-FR" dirty="0">
+              <a:latin typeface="Cambria Math" panose="02040503050406030204" pitchFamily="18" charset="0"/>
+              <a:ea typeface="Cambria Math" panose="02040503050406030204" pitchFamily="18" charset="0"/>
+            </a:endParaRPr>
           </a:p>
         </p:txBody>
       </p:sp>
@@ -3420,7 +3444,7 @@
         </p:nvSpPr>
         <p:spPr>
           <a:xfrm>
-            <a:off x="1524000" y="3534300"/>
+            <a:off x="1524000" y="3514726"/>
             <a:ext cx="9144000" cy="392913"/>
           </a:xfrm>
         </p:spPr>
@@ -3431,12 +3455,179 @@
           <a:lstStyle/>
           <a:p>
             <a:r>
-              <a:rPr lang="fr-FR" sz="2000" i="1" dirty="0"/>
+              <a:rPr lang="fr-FR" sz="1800" i="1" dirty="0"/>
               <a:t>Cardiofréquencemètre</a:t>
             </a:r>
           </a:p>
         </p:txBody>
       </p:sp>
+      <p:sp>
+        <p:nvSpPr>
+          <p:cNvPr id="4" name="ZoneTexte 3">
+            <a:extLst>
+              <a:ext uri="{FF2B5EF4-FFF2-40B4-BE49-F238E27FC236}">
+                <a16:creationId xmlns:a16="http://schemas.microsoft.com/office/drawing/2014/main" id="{9E598DD9-9F77-4F60-BFD1-60695DF8E304}"/>
+              </a:ext>
+            </a:extLst>
+          </p:cNvPr>
+          <p:cNvSpPr txBox="1"/>
+          <p:nvPr/>
+        </p:nvSpPr>
+        <p:spPr>
+          <a:xfrm>
+            <a:off x="9925050" y="5657671"/>
+            <a:ext cx="3286125" cy="1200329"/>
+          </a:xfrm>
+          <a:prstGeom prst="rect">
+            <a:avLst/>
+          </a:prstGeom>
+          <a:noFill/>
+        </p:spPr>
+        <p:txBody>
+          <a:bodyPr wrap="square" rtlCol="0">
+            <a:spAutoFit/>
+          </a:bodyPr>
+          <a:lstStyle/>
+          <a:p>
+            <a:pPr marL="285750" indent="-285750">
+              <a:buFont typeface="Arial" panose="020B0604020202020204" pitchFamily="34" charset="0"/>
+              <a:buChar char="•"/>
+            </a:pPr>
+            <a:r>
+              <a:rPr lang="fr-FR" dirty="0"/>
+              <a:t>BALDAZZA Louka </a:t>
+            </a:r>
+          </a:p>
+          <a:p>
+            <a:pPr marL="285750" indent="-285750">
+              <a:buFont typeface="Arial" panose="020B0604020202020204" pitchFamily="34" charset="0"/>
+              <a:buChar char="•"/>
+            </a:pPr>
+            <a:r>
+              <a:rPr lang="fr-FR" dirty="0"/>
+              <a:t>ONFRAY Vincent</a:t>
+            </a:r>
+          </a:p>
+          <a:p>
+            <a:pPr marL="285750" indent="-285750">
+              <a:buFont typeface="Arial" panose="020B0604020202020204" pitchFamily="34" charset="0"/>
+              <a:buChar char="•"/>
+            </a:pPr>
+            <a:r>
+              <a:rPr lang="fr-FR" dirty="0"/>
+              <a:t>BEST Guillaume</a:t>
+            </a:r>
+          </a:p>
+          <a:p>
+            <a:pPr marL="285750" indent="-285750">
+              <a:buFont typeface="Arial" panose="020B0604020202020204" pitchFamily="34" charset="0"/>
+              <a:buChar char="•"/>
+            </a:pPr>
+            <a:endParaRPr lang="fr-FR" dirty="0"/>
+          </a:p>
+        </p:txBody>
+      </p:sp>
+      <p:sp>
+        <p:nvSpPr>
+          <p:cNvPr id="5" name="ZoneTexte 4">
+            <a:extLst>
+              <a:ext uri="{FF2B5EF4-FFF2-40B4-BE49-F238E27FC236}">
+                <a16:creationId xmlns:a16="http://schemas.microsoft.com/office/drawing/2014/main" id="{21AE3C6B-75E5-416D-A8C7-DBCF96DE77DF}"/>
+              </a:ext>
+            </a:extLst>
+          </p:cNvPr>
+          <p:cNvSpPr txBox="1"/>
+          <p:nvPr/>
+        </p:nvSpPr>
+        <p:spPr>
+          <a:xfrm>
+            <a:off x="133350" y="6257835"/>
+            <a:ext cx="1390650" cy="369332"/>
+          </a:xfrm>
+          <a:prstGeom prst="rect">
+            <a:avLst/>
+          </a:prstGeom>
+          <a:noFill/>
+        </p:spPr>
+        <p:txBody>
+          <a:bodyPr wrap="square" rtlCol="0">
+            <a:spAutoFit/>
+          </a:bodyPr>
+          <a:lstStyle/>
+          <a:p>
+            <a:r>
+              <a:rPr lang="fr-FR" dirty="0"/>
+              <a:t>2017/2018</a:t>
+            </a:r>
+          </a:p>
+        </p:txBody>
+      </p:sp>
+      <p:pic>
+        <p:nvPicPr>
+          <p:cNvPr id="6" name="Image 5">
+            <a:extLst>
+              <a:ext uri="{FF2B5EF4-FFF2-40B4-BE49-F238E27FC236}">
+                <a16:creationId xmlns:a16="http://schemas.microsoft.com/office/drawing/2014/main" id="{68633DAD-D515-4DF2-848B-9296DEC33D4F}"/>
+              </a:ext>
+            </a:extLst>
+          </p:cNvPr>
+          <p:cNvPicPr>
+            <a:picLocks noChangeAspect="1"/>
+          </p:cNvPicPr>
+          <p:nvPr/>
+        </p:nvPicPr>
+        <p:blipFill>
+          <a:blip r:embed="rId2">
+            <a:extLst>
+              <a:ext uri="{28A0092B-C50C-407E-A947-70E740481C1C}">
+                <a14:useLocalDpi xmlns:a14="http://schemas.microsoft.com/office/drawing/2010/main" val="0"/>
+              </a:ext>
+            </a:extLst>
+          </a:blip>
+          <a:stretch>
+            <a:fillRect/>
+          </a:stretch>
+        </p:blipFill>
+        <p:spPr>
+          <a:xfrm>
+            <a:off x="3228975" y="5912882"/>
+            <a:ext cx="1961413" cy="714285"/>
+          </a:xfrm>
+          <a:prstGeom prst="rect">
+            <a:avLst/>
+          </a:prstGeom>
+        </p:spPr>
+      </p:pic>
+      <p:pic>
+        <p:nvPicPr>
+          <p:cNvPr id="7" name="Image 6">
+            <a:extLst>
+              <a:ext uri="{FF2B5EF4-FFF2-40B4-BE49-F238E27FC236}">
+                <a16:creationId xmlns:a16="http://schemas.microsoft.com/office/drawing/2014/main" id="{684CDDE6-B38D-4EA2-9288-2D34A375900E}"/>
+              </a:ext>
+            </a:extLst>
+          </p:cNvPr>
+          <p:cNvPicPr>
+            <a:picLocks noChangeAspect="1"/>
+          </p:cNvPicPr>
+          <p:nvPr/>
+        </p:nvPicPr>
+        <p:blipFill>
+          <a:blip r:embed="rId3"/>
+          <a:stretch>
+            <a:fillRect/>
+          </a:stretch>
+        </p:blipFill>
+        <p:spPr>
+          <a:xfrm>
+            <a:off x="7001614" y="5918111"/>
+            <a:ext cx="1284561" cy="714285"/>
+          </a:xfrm>
+          <a:prstGeom prst="rect">
+            <a:avLst/>
+          </a:prstGeom>
+        </p:spPr>
+      </p:pic>
     </p:spTree>
     <p:extLst>
       <p:ext uri="{BB962C8B-B14F-4D97-AF65-F5344CB8AC3E}">
@@ -3483,40 +3674,21 @@
             <p:ph type="title"/>
           </p:nvPr>
         </p:nvSpPr>
-        <p:spPr/>
+        <p:spPr>
+          <a:xfrm>
+            <a:off x="838200" y="2766218"/>
+            <a:ext cx="10515600" cy="1325563"/>
+          </a:xfrm>
+        </p:spPr>
         <p:txBody>
           <a:bodyPr/>
           <a:lstStyle/>
           <a:p>
+            <a:pPr algn="ctr"/>
             <a:r>
               <a:rPr lang="fr-FR" dirty="0"/>
               <a:t>Présentation direct ou vidéo du projet </a:t>
             </a:r>
-          </a:p>
-        </p:txBody>
-      </p:sp>
-      <p:sp>
-        <p:nvSpPr>
-          <p:cNvPr id="3" name="Espace réservé du contenu 2">
-            <a:extLst>
-              <a:ext uri="{FF2B5EF4-FFF2-40B4-BE49-F238E27FC236}">
-                <a16:creationId xmlns:a16="http://schemas.microsoft.com/office/drawing/2014/main" id="{7FD77E72-D6AD-4D51-870A-13D301D7F037}"/>
-              </a:ext>
-            </a:extLst>
-          </p:cNvPr>
-          <p:cNvSpPr>
-            <a:spLocks noGrp="1"/>
-          </p:cNvSpPr>
-          <p:nvPr>
-            <p:ph idx="1"/>
-          </p:nvPr>
-        </p:nvSpPr>
-        <p:spPr/>
-        <p:txBody>
-          <a:bodyPr/>
-          <a:lstStyle/>
-          <a:p>
-            <a:endParaRPr lang="fr-FR"/>
           </a:p>
         </p:txBody>
       </p:sp>
@@ -3744,13 +3916,17 @@
           </a:xfrm>
         </p:spPr>
         <p:txBody>
-          <a:bodyPr/>
+          <a:bodyPr>
+            <a:normAutofit/>
+          </a:bodyPr>
           <a:lstStyle/>
           <a:p>
             <a:pPr algn="ctr"/>
             <a:r>
-              <a:rPr lang="fr-FR" dirty="0"/>
-              <a:t>Contexte</a:t>
+              <a:rPr lang="fr-FR" sz="5400" b="1" dirty="0">
+                <a:latin typeface="Freestyle Script" panose="030804020302050B0404" pitchFamily="66" charset="0"/>
+              </a:rPr>
+              <a:t>Contexte du Projet</a:t>
             </a:r>
           </a:p>
         </p:txBody>
@@ -3783,8 +3959,8 @@
         </p:blipFill>
         <p:spPr>
           <a:xfrm>
-            <a:off x="395799" y="2624328"/>
-            <a:ext cx="5593522" cy="2036984"/>
+            <a:off x="1333500" y="2470383"/>
+            <a:ext cx="3423606" cy="1246770"/>
           </a:xfrm>
           <a:prstGeom prst="rect">
             <a:avLst/>
@@ -3825,7 +4001,7 @@
             </a:pPr>
             <a:r>
               <a:rPr lang="fr-FR" sz="2400" dirty="0"/>
-              <a:t>Projet de sante prometteur </a:t>
+              <a:t>Projet de santé prometteur </a:t>
             </a:r>
           </a:p>
           <a:p>
@@ -3872,6 +4048,36 @@
           </a:p>
         </p:txBody>
       </p:sp>
+      <p:pic>
+        <p:nvPicPr>
+          <p:cNvPr id="5" name="Image 4">
+            <a:extLst>
+              <a:ext uri="{FF2B5EF4-FFF2-40B4-BE49-F238E27FC236}">
+                <a16:creationId xmlns:a16="http://schemas.microsoft.com/office/drawing/2014/main" id="{9C518AA9-6E9C-463E-BFBD-A3D075C61CD1}"/>
+              </a:ext>
+            </a:extLst>
+          </p:cNvPr>
+          <p:cNvPicPr>
+            <a:picLocks noChangeAspect="1"/>
+          </p:cNvPicPr>
+          <p:nvPr/>
+        </p:nvPicPr>
+        <p:blipFill>
+          <a:blip r:embed="rId3"/>
+          <a:stretch>
+            <a:fillRect/>
+          </a:stretch>
+        </p:blipFill>
+        <p:spPr>
+          <a:xfrm>
+            <a:off x="2005013" y="4176410"/>
+            <a:ext cx="1881188" cy="1046042"/>
+          </a:xfrm>
+          <a:prstGeom prst="rect">
+            <a:avLst/>
+          </a:prstGeom>
+        </p:spPr>
+      </p:pic>
     </p:spTree>
     <p:extLst>
       <p:ext uri="{BB962C8B-B14F-4D97-AF65-F5344CB8AC3E}">
@@ -3945,8 +4151,8 @@
         </p:nvSpPr>
         <p:spPr>
           <a:xfrm>
-            <a:off x="838200" y="2090172"/>
-            <a:ext cx="10326624" cy="4339650"/>
+            <a:off x="1563210" y="1690688"/>
+            <a:ext cx="4532790" cy="4339650"/>
           </a:xfrm>
           <a:prstGeom prst="rect">
             <a:avLst/>
@@ -4976,7 +5182,7 @@
           </p:cNvPicPr>
           <p:nvPr/>
         </p:nvPicPr>
-        <p:blipFill>
+        <p:blipFill rotWithShape="1">
           <a:blip r:embed="rId2">
             <a:extLst>
               <a:ext uri="{28A0092B-C50C-407E-A947-70E740481C1C}">
@@ -4984,20 +5190,89 @@
               </a:ext>
             </a:extLst>
           </a:blip>
-          <a:stretch>
-            <a:fillRect/>
-          </a:stretch>
+          <a:srcRect l="285" t="-84" r="48868" b="1210"/>
+          <a:stretch/>
         </p:blipFill>
         <p:spPr>
           <a:xfrm>
-            <a:off x="1238497" y="1376057"/>
-            <a:ext cx="9947036" cy="5317706"/>
+            <a:off x="752475" y="1385551"/>
+            <a:ext cx="4524375" cy="4703305"/>
           </a:xfrm>
           <a:prstGeom prst="rect">
             <a:avLst/>
           </a:prstGeom>
         </p:spPr>
       </p:pic>
+      <p:pic>
+        <p:nvPicPr>
+          <p:cNvPr id="5" name="Image 4">
+            <a:extLst>
+              <a:ext uri="{FF2B5EF4-FFF2-40B4-BE49-F238E27FC236}">
+                <a16:creationId xmlns:a16="http://schemas.microsoft.com/office/drawing/2014/main" id="{445DEDB0-9AD7-4E0D-A9ED-2DC4D588BDE2}"/>
+              </a:ext>
+            </a:extLst>
+          </p:cNvPr>
+          <p:cNvPicPr>
+            <a:picLocks noChangeAspect="1"/>
+          </p:cNvPicPr>
+          <p:nvPr/>
+        </p:nvPicPr>
+        <p:blipFill rotWithShape="1">
+          <a:blip r:embed="rId2">
+            <a:extLst>
+              <a:ext uri="{28A0092B-C50C-407E-A947-70E740481C1C}">
+                <a14:useLocalDpi xmlns:a14="http://schemas.microsoft.com/office/drawing/2010/main" val="0"/>
+              </a:ext>
+            </a:extLst>
+          </a:blip>
+          <a:srcRect l="60133" t="1170" r="606" b="1390"/>
+          <a:stretch/>
+        </p:blipFill>
+        <p:spPr>
+          <a:xfrm>
+            <a:off x="7867650" y="1385551"/>
+            <a:ext cx="3084822" cy="4093032"/>
+          </a:xfrm>
+          <a:prstGeom prst="rect">
+            <a:avLst/>
+          </a:prstGeom>
+        </p:spPr>
+      </p:pic>
+      <p:sp>
+        <p:nvSpPr>
+          <p:cNvPr id="3" name="ZoneTexte 2">
+            <a:extLst>
+              <a:ext uri="{FF2B5EF4-FFF2-40B4-BE49-F238E27FC236}">
+                <a16:creationId xmlns:a16="http://schemas.microsoft.com/office/drawing/2014/main" id="{F14F6C69-4A46-4993-9BB1-8DD65BC43E0B}"/>
+              </a:ext>
+            </a:extLst>
+          </p:cNvPr>
+          <p:cNvSpPr txBox="1"/>
+          <p:nvPr/>
+        </p:nvSpPr>
+        <p:spPr>
+          <a:xfrm>
+            <a:off x="7867650" y="5472449"/>
+            <a:ext cx="3084822" cy="276999"/>
+          </a:xfrm>
+          <a:prstGeom prst="rect">
+            <a:avLst/>
+          </a:prstGeom>
+          <a:noFill/>
+        </p:spPr>
+        <p:txBody>
+          <a:bodyPr wrap="square" rtlCol="0">
+            <a:spAutoFit/>
+          </a:bodyPr>
+          <a:lstStyle/>
+          <a:p>
+            <a:r>
+              <a:rPr lang="fr-FR" sz="1200" i="1" dirty="0"/>
+              <a:t>Montage  du cœur de  LED</a:t>
+            </a:r>
+          </a:p>
+        </p:txBody>
+      </p:sp>
     </p:spTree>
     <p:extLst>
       <p:ext uri="{BB962C8B-B14F-4D97-AF65-F5344CB8AC3E}">
@@ -5157,12 +5432,221 @@
             <p:ph idx="1"/>
           </p:nvPr>
         </p:nvSpPr>
-        <p:spPr/>
-        <p:txBody>
-          <a:bodyPr/>
-          <a:lstStyle/>
-          <a:p>
-            <a:endParaRPr lang="fr-FR"/>
+        <p:spPr>
+          <a:xfrm>
+            <a:off x="740544" y="1690688"/>
+            <a:ext cx="3653903" cy="795060"/>
+          </a:xfrm>
+        </p:spPr>
+        <p:txBody>
+          <a:bodyPr>
+            <a:normAutofit/>
+          </a:bodyPr>
+          <a:lstStyle/>
+          <a:p>
+            <a:r>
+              <a:rPr lang="fr-FR" dirty="0"/>
+              <a:t>Organisation du code:</a:t>
+            </a:r>
+          </a:p>
+        </p:txBody>
+      </p:sp>
+      <p:sp>
+        <p:nvSpPr>
+          <p:cNvPr id="4" name="Espace réservé du contenu 2">
+            <a:extLst>
+              <a:ext uri="{FF2B5EF4-FFF2-40B4-BE49-F238E27FC236}">
+                <a16:creationId xmlns:a16="http://schemas.microsoft.com/office/drawing/2014/main" id="{A476CDD7-04DC-4C13-8259-13582BE27190}"/>
+              </a:ext>
+            </a:extLst>
+          </p:cNvPr>
+          <p:cNvSpPr txBox="1">
+            <a:spLocks/>
+          </p:cNvSpPr>
+          <p:nvPr/>
+        </p:nvSpPr>
+        <p:spPr>
+          <a:xfrm>
+            <a:off x="6548020" y="1690688"/>
+            <a:ext cx="3723444" cy="795060"/>
+          </a:xfrm>
+          <a:prstGeom prst="rect">
+            <a:avLst/>
+          </a:prstGeom>
+        </p:spPr>
+        <p:txBody>
+          <a:bodyPr vert="horz" lIns="91440" tIns="45720" rIns="91440" bIns="45720" rtlCol="0">
+            <a:normAutofit/>
+          </a:bodyPr>
+          <a:lstStyle>
+            <a:lvl1pPr marL="228600" indent="-228600" algn="l" defTabSz="914400" rtl="0" eaLnBrk="1" latinLnBrk="0" hangingPunct="1">
+              <a:lnSpc>
+                <a:spcPct val="90000"/>
+              </a:lnSpc>
+              <a:spcBef>
+                <a:spcPts val="1000"/>
+              </a:spcBef>
+              <a:buFont typeface="Arial" panose="020B0604020202020204" pitchFamily="34" charset="0"/>
+              <a:buChar char="•"/>
+              <a:defRPr sz="2800" kern="1200">
+                <a:solidFill>
+                  <a:schemeClr val="tx1"/>
+                </a:solidFill>
+                <a:latin typeface="+mn-lt"/>
+                <a:ea typeface="+mn-ea"/>
+                <a:cs typeface="+mn-cs"/>
+              </a:defRPr>
+            </a:lvl1pPr>
+            <a:lvl2pPr marL="685800" indent="-228600" algn="l" defTabSz="914400" rtl="0" eaLnBrk="1" latinLnBrk="0" hangingPunct="1">
+              <a:lnSpc>
+                <a:spcPct val="90000"/>
+              </a:lnSpc>
+              <a:spcBef>
+                <a:spcPts val="500"/>
+              </a:spcBef>
+              <a:buFont typeface="Arial" panose="020B0604020202020204" pitchFamily="34" charset="0"/>
+              <a:buChar char="•"/>
+              <a:defRPr sz="2400" kern="1200">
+                <a:solidFill>
+                  <a:schemeClr val="tx1"/>
+                </a:solidFill>
+                <a:latin typeface="+mn-lt"/>
+                <a:ea typeface="+mn-ea"/>
+                <a:cs typeface="+mn-cs"/>
+              </a:defRPr>
+            </a:lvl2pPr>
+            <a:lvl3pPr marL="1143000" indent="-228600" algn="l" defTabSz="914400" rtl="0" eaLnBrk="1" latinLnBrk="0" hangingPunct="1">
+              <a:lnSpc>
+                <a:spcPct val="90000"/>
+              </a:lnSpc>
+              <a:spcBef>
+                <a:spcPts val="500"/>
+              </a:spcBef>
+              <a:buFont typeface="Arial" panose="020B0604020202020204" pitchFamily="34" charset="0"/>
+              <a:buChar char="•"/>
+              <a:defRPr sz="2000" kern="1200">
+                <a:solidFill>
+                  <a:schemeClr val="tx1"/>
+                </a:solidFill>
+                <a:latin typeface="+mn-lt"/>
+                <a:ea typeface="+mn-ea"/>
+                <a:cs typeface="+mn-cs"/>
+              </a:defRPr>
+            </a:lvl3pPr>
+            <a:lvl4pPr marL="1600200" indent="-228600" algn="l" defTabSz="914400" rtl="0" eaLnBrk="1" latinLnBrk="0" hangingPunct="1">
+              <a:lnSpc>
+                <a:spcPct val="90000"/>
+              </a:lnSpc>
+              <a:spcBef>
+                <a:spcPts val="500"/>
+              </a:spcBef>
+              <a:buFont typeface="Arial" panose="020B0604020202020204" pitchFamily="34" charset="0"/>
+              <a:buChar char="•"/>
+              <a:defRPr sz="1800" kern="1200">
+                <a:solidFill>
+                  <a:schemeClr val="tx1"/>
+                </a:solidFill>
+                <a:latin typeface="+mn-lt"/>
+                <a:ea typeface="+mn-ea"/>
+                <a:cs typeface="+mn-cs"/>
+              </a:defRPr>
+            </a:lvl4pPr>
+            <a:lvl5pPr marL="2057400" indent="-228600" algn="l" defTabSz="914400" rtl="0" eaLnBrk="1" latinLnBrk="0" hangingPunct="1">
+              <a:lnSpc>
+                <a:spcPct val="90000"/>
+              </a:lnSpc>
+              <a:spcBef>
+                <a:spcPts val="500"/>
+              </a:spcBef>
+              <a:buFont typeface="Arial" panose="020B0604020202020204" pitchFamily="34" charset="0"/>
+              <a:buChar char="•"/>
+              <a:defRPr sz="1800" kern="1200">
+                <a:solidFill>
+                  <a:schemeClr val="tx1"/>
+                </a:solidFill>
+                <a:latin typeface="+mn-lt"/>
+                <a:ea typeface="+mn-ea"/>
+                <a:cs typeface="+mn-cs"/>
+              </a:defRPr>
+            </a:lvl5pPr>
+            <a:lvl6pPr marL="2514600" indent="-228600" algn="l" defTabSz="914400" rtl="0" eaLnBrk="1" latinLnBrk="0" hangingPunct="1">
+              <a:lnSpc>
+                <a:spcPct val="90000"/>
+              </a:lnSpc>
+              <a:spcBef>
+                <a:spcPts val="500"/>
+              </a:spcBef>
+              <a:buFont typeface="Arial" panose="020B0604020202020204" pitchFamily="34" charset="0"/>
+              <a:buChar char="•"/>
+              <a:defRPr sz="1800" kern="1200">
+                <a:solidFill>
+                  <a:schemeClr val="tx1"/>
+                </a:solidFill>
+                <a:latin typeface="+mn-lt"/>
+                <a:ea typeface="+mn-ea"/>
+                <a:cs typeface="+mn-cs"/>
+              </a:defRPr>
+            </a:lvl6pPr>
+            <a:lvl7pPr marL="2971800" indent="-228600" algn="l" defTabSz="914400" rtl="0" eaLnBrk="1" latinLnBrk="0" hangingPunct="1">
+              <a:lnSpc>
+                <a:spcPct val="90000"/>
+              </a:lnSpc>
+              <a:spcBef>
+                <a:spcPts val="500"/>
+              </a:spcBef>
+              <a:buFont typeface="Arial" panose="020B0604020202020204" pitchFamily="34" charset="0"/>
+              <a:buChar char="•"/>
+              <a:defRPr sz="1800" kern="1200">
+                <a:solidFill>
+                  <a:schemeClr val="tx1"/>
+                </a:solidFill>
+                <a:latin typeface="+mn-lt"/>
+                <a:ea typeface="+mn-ea"/>
+                <a:cs typeface="+mn-cs"/>
+              </a:defRPr>
+            </a:lvl7pPr>
+            <a:lvl8pPr marL="3429000" indent="-228600" algn="l" defTabSz="914400" rtl="0" eaLnBrk="1" latinLnBrk="0" hangingPunct="1">
+              <a:lnSpc>
+                <a:spcPct val="90000"/>
+              </a:lnSpc>
+              <a:spcBef>
+                <a:spcPts val="500"/>
+              </a:spcBef>
+              <a:buFont typeface="Arial" panose="020B0604020202020204" pitchFamily="34" charset="0"/>
+              <a:buChar char="•"/>
+              <a:defRPr sz="1800" kern="1200">
+                <a:solidFill>
+                  <a:schemeClr val="tx1"/>
+                </a:solidFill>
+                <a:latin typeface="+mn-lt"/>
+                <a:ea typeface="+mn-ea"/>
+                <a:cs typeface="+mn-cs"/>
+              </a:defRPr>
+            </a:lvl8pPr>
+            <a:lvl9pPr marL="3886200" indent="-228600" algn="l" defTabSz="914400" rtl="0" eaLnBrk="1" latinLnBrk="0" hangingPunct="1">
+              <a:lnSpc>
+                <a:spcPct val="90000"/>
+              </a:lnSpc>
+              <a:spcBef>
+                <a:spcPts val="500"/>
+              </a:spcBef>
+              <a:buFont typeface="Arial" panose="020B0604020202020204" pitchFamily="34" charset="0"/>
+              <a:buChar char="•"/>
+              <a:defRPr sz="1800" kern="1200">
+                <a:solidFill>
+                  <a:schemeClr val="tx1"/>
+                </a:solidFill>
+                <a:latin typeface="+mn-lt"/>
+                <a:ea typeface="+mn-ea"/>
+                <a:cs typeface="+mn-cs"/>
+              </a:defRPr>
+            </a:lvl9pPr>
+          </a:lstStyle>
+          <a:p>
+            <a:r>
+              <a:rPr lang="fr-FR" dirty="0"/>
+              <a:t>O</a:t>
+            </a:r>
           </a:p>
         </p:txBody>
       </p:sp>
@@ -5225,41 +5709,1035 @@
           </a:p>
         </p:txBody>
       </p:sp>
-      <p:pic>
-        <p:nvPicPr>
-          <p:cNvPr id="5" name="Espace réservé du contenu 4">
-            <a:extLst>
-              <a:ext uri="{FF2B5EF4-FFF2-40B4-BE49-F238E27FC236}">
-                <a16:creationId xmlns:a16="http://schemas.microsoft.com/office/drawing/2014/main" id="{BC2989A2-577F-4963-A2C2-85C4909E8405}"/>
-              </a:ext>
-            </a:extLst>
-          </p:cNvPr>
-          <p:cNvPicPr>
-            <a:picLocks noGrp="1" noChangeAspect="1"/>
-          </p:cNvPicPr>
-          <p:nvPr>
-            <p:ph idx="1"/>
-          </p:nvPr>
-        </p:nvPicPr>
-        <p:blipFill>
-          <a:blip r:embed="rId2">
-            <a:extLst>
-              <a:ext uri="{28A0092B-C50C-407E-A947-70E740481C1C}">
-                <a14:useLocalDpi xmlns:a14="http://schemas.microsoft.com/office/drawing/2010/main" val="0"/>
-              </a:ext>
-            </a:extLst>
-          </a:blip>
-          <a:stretch>
-            <a:fillRect/>
-          </a:stretch>
-        </p:blipFill>
+      <p:grpSp>
+        <p:nvGrpSpPr>
+          <p:cNvPr id="4" name="Groupe 3">
+            <a:extLst>
+              <a:ext uri="{FF2B5EF4-FFF2-40B4-BE49-F238E27FC236}">
+                <a16:creationId xmlns:a16="http://schemas.microsoft.com/office/drawing/2014/main" id="{BCDCD85C-2AC7-4B71-A3F2-34B892F11267}"/>
+              </a:ext>
+            </a:extLst>
+          </p:cNvPr>
+          <p:cNvGrpSpPr/>
+          <p:nvPr/>
+        </p:nvGrpSpPr>
+        <p:grpSpPr>
+          <a:xfrm>
+            <a:off x="1897000" y="1483067"/>
+            <a:ext cx="3403474" cy="2154201"/>
+            <a:chOff x="2340101" y="1408143"/>
+            <a:chExt cx="3403474" cy="2154201"/>
+          </a:xfrm>
+        </p:grpSpPr>
+        <p:sp>
+          <p:nvSpPr>
+            <p:cNvPr id="6" name="Rectangle 5">
+              <a:extLst>
+                <a:ext uri="{FF2B5EF4-FFF2-40B4-BE49-F238E27FC236}">
+                  <a16:creationId xmlns:a16="http://schemas.microsoft.com/office/drawing/2014/main" id="{FF2397A1-CB7A-4BF1-AA83-03B053D3EC3D}"/>
+                </a:ext>
+              </a:extLst>
+            </p:cNvPr>
+            <p:cNvSpPr/>
+            <p:nvPr/>
+          </p:nvSpPr>
+          <p:spPr>
+            <a:xfrm>
+              <a:off x="2340101" y="1408143"/>
+              <a:ext cx="3403474" cy="2154201"/>
+            </a:xfrm>
+            <a:prstGeom prst="rect">
+              <a:avLst/>
+            </a:prstGeom>
+            <a:gradFill>
+              <a:gsLst>
+                <a:gs pos="0">
+                  <a:srgbClr val="FF7979"/>
+                </a:gs>
+                <a:gs pos="50000">
+                  <a:srgbClr val="FF4F4F"/>
+                </a:gs>
+                <a:gs pos="100000">
+                  <a:srgbClr val="FF0000"/>
+                </a:gs>
+              </a:gsLst>
+              <a:lin ang="5400000" scaled="0"/>
+            </a:gradFill>
+            <a:ln>
+              <a:noFill/>
+            </a:ln>
+            <a:effectLst>
+              <a:outerShdw blurRad="50800" dist="38100" dir="2700000" algn="tl" rotWithShape="0">
+                <a:prstClr val="black">
+                  <a:alpha val="40000"/>
+                </a:prstClr>
+              </a:outerShdw>
+              <a:softEdge rad="31750"/>
+            </a:effectLst>
+          </p:spPr>
+          <p:style>
+            <a:lnRef idx="0">
+              <a:schemeClr val="accent2"/>
+            </a:lnRef>
+            <a:fillRef idx="3">
+              <a:schemeClr val="accent2"/>
+            </a:fillRef>
+            <a:effectRef idx="3">
+              <a:schemeClr val="accent2"/>
+            </a:effectRef>
+            <a:fontRef idx="minor">
+              <a:schemeClr val="lt1"/>
+            </a:fontRef>
+          </p:style>
+          <p:txBody>
+            <a:bodyPr rtlCol="0" anchor="ctr"/>
+            <a:lstStyle/>
+            <a:p>
+              <a:pPr algn="ctr"/>
+              <a:endParaRPr lang="fr-FR"/>
+            </a:p>
+          </p:txBody>
+        </p:sp>
+        <p:sp>
+          <p:nvSpPr>
+            <p:cNvPr id="7" name="ZoneTexte 6">
+              <a:extLst>
+                <a:ext uri="{FF2B5EF4-FFF2-40B4-BE49-F238E27FC236}">
+                  <a16:creationId xmlns:a16="http://schemas.microsoft.com/office/drawing/2014/main" id="{BF42CAE0-7A1D-405D-BE11-430D874D2150}"/>
+                </a:ext>
+              </a:extLst>
+            </p:cNvPr>
+            <p:cNvSpPr txBox="1"/>
+            <p:nvPr/>
+          </p:nvSpPr>
+          <p:spPr>
+            <a:xfrm>
+              <a:off x="2375322" y="1432047"/>
+              <a:ext cx="3325179" cy="2031325"/>
+            </a:xfrm>
+            <a:prstGeom prst="rect">
+              <a:avLst/>
+            </a:prstGeom>
+            <a:noFill/>
+          </p:spPr>
+          <p:txBody>
+            <a:bodyPr wrap="square" rtlCol="0">
+              <a:spAutoFit/>
+            </a:bodyPr>
+            <a:lstStyle/>
+            <a:p>
+              <a:r>
+                <a:rPr lang="fr-FR" dirty="0">
+                  <a:solidFill>
+                    <a:schemeClr val="bg1"/>
+                  </a:solidFill>
+                </a:rPr>
+                <a:t>Module 1: Cardiofréquencemètre</a:t>
+              </a:r>
+            </a:p>
+            <a:p>
+              <a:endParaRPr lang="fr-FR" dirty="0"/>
+            </a:p>
+            <a:p>
+              <a:endParaRPr lang="fr-FR" dirty="0"/>
+            </a:p>
+            <a:p>
+              <a:pPr algn="ctr"/>
+              <a:r>
+                <a:rPr lang="fr-FR" dirty="0">
+                  <a:solidFill>
+                    <a:schemeClr val="bg1"/>
+                  </a:solidFill>
+                </a:rPr>
+                <a:t>Dispositif du cardio fréquencemètre </a:t>
+              </a:r>
+            </a:p>
+            <a:p>
+              <a:pPr algn="ctr"/>
+              <a:r>
+                <a:rPr lang="fr-FR" dirty="0">
+                  <a:solidFill>
+                    <a:schemeClr val="bg1"/>
+                  </a:solidFill>
+                </a:rPr>
+                <a:t>+ Code Arduino</a:t>
+              </a:r>
+            </a:p>
+            <a:p>
+              <a:endParaRPr lang="fr-FR" dirty="0"/>
+            </a:p>
+          </p:txBody>
+        </p:sp>
+      </p:grpSp>
+      <p:grpSp>
+        <p:nvGrpSpPr>
+          <p:cNvPr id="8" name="Groupe 7">
+            <a:extLst>
+              <a:ext uri="{FF2B5EF4-FFF2-40B4-BE49-F238E27FC236}">
+                <a16:creationId xmlns:a16="http://schemas.microsoft.com/office/drawing/2014/main" id="{BE01D75D-8B00-4E1F-B5E6-38324AB931F5}"/>
+              </a:ext>
+            </a:extLst>
+          </p:cNvPr>
+          <p:cNvGrpSpPr/>
+          <p:nvPr/>
+        </p:nvGrpSpPr>
+        <p:grpSpPr>
+          <a:xfrm>
+            <a:off x="7110602" y="1445546"/>
+            <a:ext cx="3403474" cy="2154173"/>
+            <a:chOff x="7653527" y="1408143"/>
+            <a:chExt cx="3403474" cy="2154173"/>
+          </a:xfrm>
+        </p:grpSpPr>
+        <p:sp>
+          <p:nvSpPr>
+            <p:cNvPr id="9" name="Rectangle 8">
+              <a:extLst>
+                <a:ext uri="{FF2B5EF4-FFF2-40B4-BE49-F238E27FC236}">
+                  <a16:creationId xmlns:a16="http://schemas.microsoft.com/office/drawing/2014/main" id="{8A20443A-3B07-401F-9FBD-AB241BEBD7EC}"/>
+                </a:ext>
+              </a:extLst>
+            </p:cNvPr>
+            <p:cNvSpPr/>
+            <p:nvPr/>
+          </p:nvSpPr>
+          <p:spPr>
+            <a:xfrm>
+              <a:off x="7653527" y="1408143"/>
+              <a:ext cx="3403474" cy="2154173"/>
+            </a:xfrm>
+            <a:prstGeom prst="rect">
+              <a:avLst/>
+            </a:prstGeom>
+            <a:ln/>
+            <a:effectLst>
+              <a:outerShdw blurRad="50800" dist="38100" dir="2700000" algn="tl" rotWithShape="0">
+                <a:prstClr val="black">
+                  <a:alpha val="40000"/>
+                </a:prstClr>
+              </a:outerShdw>
+              <a:softEdge rad="31750"/>
+            </a:effectLst>
+          </p:spPr>
+          <p:style>
+            <a:lnRef idx="0">
+              <a:schemeClr val="accent1"/>
+            </a:lnRef>
+            <a:fillRef idx="3">
+              <a:schemeClr val="accent1"/>
+            </a:fillRef>
+            <a:effectRef idx="3">
+              <a:schemeClr val="accent1"/>
+            </a:effectRef>
+            <a:fontRef idx="minor">
+              <a:schemeClr val="lt1"/>
+            </a:fontRef>
+          </p:style>
+          <p:txBody>
+            <a:bodyPr rtlCol="0" anchor="ctr"/>
+            <a:lstStyle/>
+            <a:p>
+              <a:pPr algn="ctr"/>
+              <a:endParaRPr lang="fr-FR"/>
+            </a:p>
+          </p:txBody>
+        </p:sp>
+        <p:sp>
+          <p:nvSpPr>
+            <p:cNvPr id="10" name="ZoneTexte 9">
+              <a:extLst>
+                <a:ext uri="{FF2B5EF4-FFF2-40B4-BE49-F238E27FC236}">
+                  <a16:creationId xmlns:a16="http://schemas.microsoft.com/office/drawing/2014/main" id="{FF7DF302-7A01-4DB2-91B5-08280FDDAFCB}"/>
+                </a:ext>
+              </a:extLst>
+            </p:cNvPr>
+            <p:cNvSpPr txBox="1"/>
+            <p:nvPr/>
+          </p:nvSpPr>
+          <p:spPr>
+            <a:xfrm>
+              <a:off x="7673011" y="1435161"/>
+              <a:ext cx="3305695" cy="2031325"/>
+            </a:xfrm>
+            <a:prstGeom prst="rect">
+              <a:avLst/>
+            </a:prstGeom>
+            <a:noFill/>
+          </p:spPr>
+          <p:txBody>
+            <a:bodyPr wrap="square" rtlCol="0">
+              <a:spAutoFit/>
+            </a:bodyPr>
+            <a:lstStyle/>
+            <a:p>
+              <a:r>
+                <a:rPr lang="fr-FR" dirty="0">
+                  <a:solidFill>
+                    <a:schemeClr val="bg1"/>
+                  </a:solidFill>
+                </a:rPr>
+                <a:t>Module 2: Cœur de LED</a:t>
+              </a:r>
+            </a:p>
+            <a:p>
+              <a:endParaRPr lang="fr-FR" dirty="0"/>
+            </a:p>
+            <a:p>
+              <a:endParaRPr lang="fr-FR" dirty="0"/>
+            </a:p>
+            <a:p>
+              <a:pPr algn="ctr"/>
+              <a:r>
+                <a:rPr lang="fr-FR" dirty="0">
+                  <a:solidFill>
+                    <a:schemeClr val="bg1"/>
+                  </a:solidFill>
+                </a:rPr>
+                <a:t>Visualisation des battements détectées</a:t>
+              </a:r>
+            </a:p>
+            <a:p>
+              <a:pPr algn="ctr"/>
+              <a:r>
+                <a:rPr lang="fr-FR" dirty="0">
+                  <a:solidFill>
+                    <a:schemeClr val="bg1"/>
+                  </a:solidFill>
+                </a:rPr>
+                <a:t>+Code Arduino</a:t>
+              </a:r>
+            </a:p>
+            <a:p>
+              <a:endParaRPr lang="fr-FR" dirty="0"/>
+            </a:p>
+          </p:txBody>
+        </p:sp>
+      </p:grpSp>
+      <p:grpSp>
+        <p:nvGrpSpPr>
+          <p:cNvPr id="11" name="Groupe 10">
+            <a:extLst>
+              <a:ext uri="{FF2B5EF4-FFF2-40B4-BE49-F238E27FC236}">
+                <a16:creationId xmlns:a16="http://schemas.microsoft.com/office/drawing/2014/main" id="{26B14616-10B4-4B37-A123-2F2A1EB769F2}"/>
+              </a:ext>
+            </a:extLst>
+          </p:cNvPr>
+          <p:cNvGrpSpPr/>
+          <p:nvPr/>
+        </p:nvGrpSpPr>
+        <p:grpSpPr>
+          <a:xfrm>
+            <a:off x="1867769" y="4208991"/>
+            <a:ext cx="3389631" cy="2154174"/>
+            <a:chOff x="2355659" y="4131916"/>
+            <a:chExt cx="3389631" cy="2154174"/>
+          </a:xfrm>
+        </p:grpSpPr>
+        <p:sp>
+          <p:nvSpPr>
+            <p:cNvPr id="12" name="Rectangle 11">
+              <a:extLst>
+                <a:ext uri="{FF2B5EF4-FFF2-40B4-BE49-F238E27FC236}">
+                  <a16:creationId xmlns:a16="http://schemas.microsoft.com/office/drawing/2014/main" id="{5BBBE92C-545F-4CE0-A194-E068C33F28CD}"/>
+                </a:ext>
+              </a:extLst>
+            </p:cNvPr>
+            <p:cNvSpPr/>
+            <p:nvPr/>
+          </p:nvSpPr>
+          <p:spPr>
+            <a:xfrm>
+              <a:off x="2355659" y="4131917"/>
+              <a:ext cx="3364506" cy="2154173"/>
+            </a:xfrm>
+            <a:prstGeom prst="rect">
+              <a:avLst/>
+            </a:prstGeom>
+            <a:ln/>
+            <a:effectLst>
+              <a:outerShdw blurRad="50800" dist="38100" dir="2700000" algn="tl" rotWithShape="0">
+                <a:prstClr val="black">
+                  <a:alpha val="40000"/>
+                </a:prstClr>
+              </a:outerShdw>
+              <a:softEdge rad="31750"/>
+            </a:effectLst>
+          </p:spPr>
+          <p:style>
+            <a:lnRef idx="0">
+              <a:schemeClr val="accent6"/>
+            </a:lnRef>
+            <a:fillRef idx="3">
+              <a:schemeClr val="accent6"/>
+            </a:fillRef>
+            <a:effectRef idx="3">
+              <a:schemeClr val="accent6"/>
+            </a:effectRef>
+            <a:fontRef idx="minor">
+              <a:schemeClr val="lt1"/>
+            </a:fontRef>
+          </p:style>
+          <p:txBody>
+            <a:bodyPr rtlCol="0" anchor="ctr"/>
+            <a:lstStyle/>
+            <a:p>
+              <a:pPr algn="ctr"/>
+              <a:endParaRPr lang="fr-FR"/>
+            </a:p>
+          </p:txBody>
+        </p:sp>
+        <p:sp>
+          <p:nvSpPr>
+            <p:cNvPr id="13" name="ZoneTexte 12">
+              <a:extLst>
+                <a:ext uri="{FF2B5EF4-FFF2-40B4-BE49-F238E27FC236}">
+                  <a16:creationId xmlns:a16="http://schemas.microsoft.com/office/drawing/2014/main" id="{4D80B35E-9B0D-4739-A410-EA33516C7F5F}"/>
+                </a:ext>
+              </a:extLst>
+            </p:cNvPr>
+            <p:cNvSpPr txBox="1"/>
+            <p:nvPr/>
+          </p:nvSpPr>
+          <p:spPr>
+            <a:xfrm>
+              <a:off x="2375322" y="4131916"/>
+              <a:ext cx="3369968" cy="1754326"/>
+            </a:xfrm>
+            <a:prstGeom prst="rect">
+              <a:avLst/>
+            </a:prstGeom>
+            <a:noFill/>
+          </p:spPr>
+          <p:txBody>
+            <a:bodyPr wrap="square" rtlCol="0">
+              <a:spAutoFit/>
+            </a:bodyPr>
+            <a:lstStyle/>
+            <a:p>
+              <a:r>
+                <a:rPr lang="fr-FR" dirty="0">
+                  <a:solidFill>
+                    <a:schemeClr val="bg1"/>
+                  </a:solidFill>
+                </a:rPr>
+                <a:t>Module 3: </a:t>
+              </a:r>
+              <a:r>
+                <a:rPr lang="fr-FR" dirty="0" err="1">
+                  <a:solidFill>
+                    <a:schemeClr val="bg1"/>
+                  </a:solidFill>
+                </a:rPr>
+                <a:t>Processing</a:t>
+              </a:r>
+              <a:endParaRPr lang="fr-FR" dirty="0">
+                <a:solidFill>
+                  <a:schemeClr val="bg1"/>
+                </a:solidFill>
+              </a:endParaRPr>
+            </a:p>
+            <a:p>
+              <a:endParaRPr lang="fr-FR" dirty="0"/>
+            </a:p>
+            <a:p>
+              <a:pPr algn="ctr"/>
+              <a:endParaRPr lang="fr-FR" dirty="0">
+                <a:solidFill>
+                  <a:schemeClr val="bg1"/>
+                </a:solidFill>
+              </a:endParaRPr>
+            </a:p>
+            <a:p>
+              <a:pPr algn="ctr"/>
+              <a:r>
+                <a:rPr lang="fr-FR" dirty="0">
+                  <a:solidFill>
+                    <a:schemeClr val="bg1"/>
+                  </a:solidFill>
+                </a:rPr>
+                <a:t>Sauvegarde des données /</a:t>
+              </a:r>
+            </a:p>
+            <a:p>
+              <a:pPr algn="ctr"/>
+              <a:r>
+                <a:rPr lang="fr-FR" dirty="0">
+                  <a:solidFill>
+                    <a:schemeClr val="bg1"/>
+                  </a:solidFill>
+                </a:rPr>
+                <a:t>Mise sous format csv</a:t>
+              </a:r>
+            </a:p>
+            <a:p>
+              <a:endParaRPr lang="fr-FR" dirty="0"/>
+            </a:p>
+          </p:txBody>
+        </p:sp>
+      </p:grpSp>
+      <p:grpSp>
+        <p:nvGrpSpPr>
+          <p:cNvPr id="14" name="Groupe 13">
+            <a:extLst>
+              <a:ext uri="{FF2B5EF4-FFF2-40B4-BE49-F238E27FC236}">
+                <a16:creationId xmlns:a16="http://schemas.microsoft.com/office/drawing/2014/main" id="{16075115-4EA9-4F75-8AD2-C7E64DFBB52F}"/>
+              </a:ext>
+            </a:extLst>
+          </p:cNvPr>
+          <p:cNvGrpSpPr/>
+          <p:nvPr/>
+        </p:nvGrpSpPr>
+        <p:grpSpPr>
+          <a:xfrm>
+            <a:off x="7130086" y="4208991"/>
+            <a:ext cx="3389631" cy="2308324"/>
+            <a:chOff x="7647886" y="4131916"/>
+            <a:chExt cx="3389631" cy="2308324"/>
+          </a:xfrm>
+        </p:grpSpPr>
+        <p:sp>
+          <p:nvSpPr>
+            <p:cNvPr id="15" name="Rectangle 14">
+              <a:extLst>
+                <a:ext uri="{FF2B5EF4-FFF2-40B4-BE49-F238E27FC236}">
+                  <a16:creationId xmlns:a16="http://schemas.microsoft.com/office/drawing/2014/main" id="{E6DB4C5C-5DF0-41F2-B60E-7795F0C27860}"/>
+                </a:ext>
+              </a:extLst>
+            </p:cNvPr>
+            <p:cNvSpPr/>
+            <p:nvPr/>
+          </p:nvSpPr>
+          <p:spPr>
+            <a:xfrm>
+              <a:off x="7673011" y="4131916"/>
+              <a:ext cx="3364506" cy="2154173"/>
+            </a:xfrm>
+            <a:prstGeom prst="rect">
+              <a:avLst/>
+            </a:prstGeom>
+            <a:ln/>
+            <a:effectLst>
+              <a:outerShdw blurRad="50800" dist="38100" dir="2700000" algn="tl" rotWithShape="0">
+                <a:prstClr val="black">
+                  <a:alpha val="40000"/>
+                </a:prstClr>
+              </a:outerShdw>
+              <a:softEdge rad="31750"/>
+            </a:effectLst>
+          </p:spPr>
+          <p:style>
+            <a:lnRef idx="0">
+              <a:schemeClr val="accent4"/>
+            </a:lnRef>
+            <a:fillRef idx="3">
+              <a:schemeClr val="accent4"/>
+            </a:fillRef>
+            <a:effectRef idx="3">
+              <a:schemeClr val="accent4"/>
+            </a:effectRef>
+            <a:fontRef idx="minor">
+              <a:schemeClr val="lt1"/>
+            </a:fontRef>
+          </p:style>
+          <p:txBody>
+            <a:bodyPr rtlCol="0" anchor="ctr"/>
+            <a:lstStyle/>
+            <a:p>
+              <a:pPr algn="ctr"/>
+              <a:endParaRPr lang="fr-FR"/>
+            </a:p>
+          </p:txBody>
+        </p:sp>
+        <p:sp>
+          <p:nvSpPr>
+            <p:cNvPr id="16" name="ZoneTexte 15">
+              <a:extLst>
+                <a:ext uri="{FF2B5EF4-FFF2-40B4-BE49-F238E27FC236}">
+                  <a16:creationId xmlns:a16="http://schemas.microsoft.com/office/drawing/2014/main" id="{0FBCBE44-B52E-4156-B694-E358D1FF1CB7}"/>
+                </a:ext>
+              </a:extLst>
+            </p:cNvPr>
+            <p:cNvSpPr txBox="1"/>
+            <p:nvPr/>
+          </p:nvSpPr>
+          <p:spPr>
+            <a:xfrm>
+              <a:off x="7647886" y="4131916"/>
+              <a:ext cx="3364506" cy="2308324"/>
+            </a:xfrm>
+            <a:prstGeom prst="rect">
+              <a:avLst/>
+            </a:prstGeom>
+            <a:noFill/>
+          </p:spPr>
+          <p:txBody>
+            <a:bodyPr wrap="square" rtlCol="0">
+              <a:spAutoFit/>
+            </a:bodyPr>
+            <a:lstStyle/>
+            <a:p>
+              <a:r>
+                <a:rPr lang="fr-FR" dirty="0">
+                  <a:solidFill>
+                    <a:schemeClr val="bg1"/>
+                  </a:solidFill>
+                </a:rPr>
+                <a:t>Module 4: Visualisation et Manipulation </a:t>
+              </a:r>
+            </a:p>
+            <a:p>
+              <a:endParaRPr lang="fr-FR" dirty="0">
+                <a:solidFill>
+                  <a:schemeClr val="bg1"/>
+                </a:solidFill>
+              </a:endParaRPr>
+            </a:p>
+            <a:p>
+              <a:pPr algn="ctr"/>
+              <a:r>
+                <a:rPr lang="fr-FR" dirty="0">
+                  <a:solidFill>
+                    <a:schemeClr val="bg1"/>
+                  </a:solidFill>
+                </a:rPr>
+                <a:t>Programmation pour manipuler et visualiser certaines données</a:t>
+              </a:r>
+            </a:p>
+            <a:p>
+              <a:endParaRPr lang="fr-FR" dirty="0">
+                <a:solidFill>
+                  <a:schemeClr val="bg1"/>
+                </a:solidFill>
+              </a:endParaRPr>
+            </a:p>
+            <a:p>
+              <a:endParaRPr lang="fr-FR" dirty="0"/>
+            </a:p>
+            <a:p>
+              <a:endParaRPr lang="fr-FR" dirty="0"/>
+            </a:p>
+          </p:txBody>
+        </p:sp>
+      </p:grpSp>
+      <p:sp>
+        <p:nvSpPr>
+          <p:cNvPr id="3" name="Flèche : droite 2">
+            <a:extLst>
+              <a:ext uri="{FF2B5EF4-FFF2-40B4-BE49-F238E27FC236}">
+                <a16:creationId xmlns:a16="http://schemas.microsoft.com/office/drawing/2014/main" id="{F549EE5A-9001-4D9F-BA82-D9A95A065CEE}"/>
+              </a:ext>
+            </a:extLst>
+          </p:cNvPr>
+          <p:cNvSpPr/>
+          <p:nvPr/>
+        </p:nvSpPr>
         <p:spPr>
           <a:xfrm>
-            <a:off x="2256194" y="1476375"/>
-            <a:ext cx="8295998" cy="4700588"/>
+            <a:off x="5319958" y="2341657"/>
+            <a:ext cx="1810128" cy="361950"/>
           </a:xfrm>
+          <a:prstGeom prst="rightArrow">
+            <a:avLst/>
+          </a:prstGeom>
         </p:spPr>
-      </p:pic>
+        <p:style>
+          <a:lnRef idx="0">
+            <a:schemeClr val="accent2"/>
+          </a:lnRef>
+          <a:fillRef idx="3">
+            <a:schemeClr val="accent2"/>
+          </a:fillRef>
+          <a:effectRef idx="3">
+            <a:schemeClr val="accent2"/>
+          </a:effectRef>
+          <a:fontRef idx="minor">
+            <a:schemeClr val="lt1"/>
+          </a:fontRef>
+        </p:style>
+        <p:txBody>
+          <a:bodyPr rtlCol="0" anchor="ctr"/>
+          <a:lstStyle/>
+          <a:p>
+            <a:pPr algn="ctr"/>
+            <a:endParaRPr lang="fr-FR"/>
+          </a:p>
+        </p:txBody>
+      </p:sp>
+      <p:sp>
+        <p:nvSpPr>
+          <p:cNvPr id="17" name="Flèche : droite 16">
+            <a:extLst>
+              <a:ext uri="{FF2B5EF4-FFF2-40B4-BE49-F238E27FC236}">
+                <a16:creationId xmlns:a16="http://schemas.microsoft.com/office/drawing/2014/main" id="{16206ABB-8FA1-46C0-8276-D990D2A67845}"/>
+              </a:ext>
+            </a:extLst>
+          </p:cNvPr>
+          <p:cNvSpPr/>
+          <p:nvPr/>
+        </p:nvSpPr>
+        <p:spPr>
+          <a:xfrm>
+            <a:off x="5271742" y="5092757"/>
+            <a:ext cx="1858343" cy="386639"/>
+          </a:xfrm>
+          <a:prstGeom prst="rightArrow">
+            <a:avLst/>
+          </a:prstGeom>
+        </p:spPr>
+        <p:style>
+          <a:lnRef idx="0">
+            <a:schemeClr val="accent6"/>
+          </a:lnRef>
+          <a:fillRef idx="3">
+            <a:schemeClr val="accent6"/>
+          </a:fillRef>
+          <a:effectRef idx="3">
+            <a:schemeClr val="accent6"/>
+          </a:effectRef>
+          <a:fontRef idx="minor">
+            <a:schemeClr val="lt1"/>
+          </a:fontRef>
+        </p:style>
+        <p:txBody>
+          <a:bodyPr rtlCol="0" anchor="ctr"/>
+          <a:lstStyle/>
+          <a:p>
+            <a:pPr algn="ctr"/>
+            <a:endParaRPr lang="fr-FR"/>
+          </a:p>
+        </p:txBody>
+      </p:sp>
+      <p:sp>
+        <p:nvSpPr>
+          <p:cNvPr id="18" name="Flèche : bas 17">
+            <a:extLst>
+              <a:ext uri="{FF2B5EF4-FFF2-40B4-BE49-F238E27FC236}">
+                <a16:creationId xmlns:a16="http://schemas.microsoft.com/office/drawing/2014/main" id="{A7FC622D-139E-4035-8DD4-DC3D324CC084}"/>
+              </a:ext>
+            </a:extLst>
+          </p:cNvPr>
+          <p:cNvSpPr/>
+          <p:nvPr/>
+        </p:nvSpPr>
+        <p:spPr>
+          <a:xfrm>
+            <a:off x="3505200" y="3637268"/>
+            <a:ext cx="312933" cy="571722"/>
+          </a:xfrm>
+          <a:prstGeom prst="downArrow">
+            <a:avLst/>
+          </a:prstGeom>
+        </p:spPr>
+        <p:style>
+          <a:lnRef idx="0">
+            <a:schemeClr val="accent2"/>
+          </a:lnRef>
+          <a:fillRef idx="3">
+            <a:schemeClr val="accent2"/>
+          </a:fillRef>
+          <a:effectRef idx="3">
+            <a:schemeClr val="accent2"/>
+          </a:effectRef>
+          <a:fontRef idx="minor">
+            <a:schemeClr val="lt1"/>
+          </a:fontRef>
+        </p:style>
+        <p:txBody>
+          <a:bodyPr rtlCol="0" anchor="ctr"/>
+          <a:lstStyle/>
+          <a:p>
+            <a:pPr algn="ctr"/>
+            <a:endParaRPr lang="fr-FR"/>
+          </a:p>
+        </p:txBody>
+      </p:sp>
+      <p:sp>
+        <p:nvSpPr>
+          <p:cNvPr id="19" name="Rectangle 18">
+            <a:extLst>
+              <a:ext uri="{FF2B5EF4-FFF2-40B4-BE49-F238E27FC236}">
+                <a16:creationId xmlns:a16="http://schemas.microsoft.com/office/drawing/2014/main" id="{B6643758-2BB0-48FD-9979-8158BAD60B3D}"/>
+              </a:ext>
+            </a:extLst>
+          </p:cNvPr>
+          <p:cNvSpPr/>
+          <p:nvPr/>
+        </p:nvSpPr>
+        <p:spPr>
+          <a:xfrm>
+            <a:off x="3854848" y="3710506"/>
+            <a:ext cx="1530608" cy="369332"/>
+          </a:xfrm>
+          <a:prstGeom prst="rect">
+            <a:avLst/>
+          </a:prstGeom>
+          <a:noFill/>
+          <a:ln>
+            <a:solidFill>
+              <a:schemeClr val="tx1"/>
+            </a:solidFill>
+          </a:ln>
+        </p:spPr>
+        <p:style>
+          <a:lnRef idx="2">
+            <a:schemeClr val="accent1">
+              <a:shade val="50000"/>
+            </a:schemeClr>
+          </a:lnRef>
+          <a:fillRef idx="1">
+            <a:schemeClr val="accent1"/>
+          </a:fillRef>
+          <a:effectRef idx="0">
+            <a:schemeClr val="accent1"/>
+          </a:effectRef>
+          <a:fontRef idx="minor">
+            <a:schemeClr val="lt1"/>
+          </a:fontRef>
+        </p:style>
+        <p:txBody>
+          <a:bodyPr rtlCol="0" anchor="ctr"/>
+          <a:lstStyle/>
+          <a:p>
+            <a:pPr algn="ctr"/>
+            <a:endParaRPr lang="fr-FR"/>
+          </a:p>
+        </p:txBody>
+      </p:sp>
+      <p:sp>
+        <p:nvSpPr>
+          <p:cNvPr id="20" name="ZoneTexte 19">
+            <a:extLst>
+              <a:ext uri="{FF2B5EF4-FFF2-40B4-BE49-F238E27FC236}">
+                <a16:creationId xmlns:a16="http://schemas.microsoft.com/office/drawing/2014/main" id="{36469800-0F35-4FC3-89BE-D80A9A12A1B3}"/>
+              </a:ext>
+            </a:extLst>
+          </p:cNvPr>
+          <p:cNvSpPr txBox="1"/>
+          <p:nvPr/>
+        </p:nvSpPr>
+        <p:spPr>
+          <a:xfrm>
+            <a:off x="3818133" y="3715992"/>
+            <a:ext cx="1559839" cy="369332"/>
+          </a:xfrm>
+          <a:prstGeom prst="rect">
+            <a:avLst/>
+          </a:prstGeom>
+          <a:noFill/>
+        </p:spPr>
+        <p:txBody>
+          <a:bodyPr wrap="square" rtlCol="0">
+            <a:spAutoFit/>
+          </a:bodyPr>
+          <a:lstStyle/>
+          <a:p>
+            <a:pPr algn="ctr"/>
+            <a:r>
+              <a:rPr lang="fr-FR" b="1" dirty="0">
+                <a:effectLst>
+                  <a:outerShdw blurRad="38100" dist="38100" dir="2700000" algn="tl">
+                    <a:srgbClr val="000000">
+                      <a:alpha val="43137"/>
+                    </a:srgbClr>
+                  </a:outerShdw>
+                </a:effectLst>
+                <a:latin typeface="Microsoft Sans Serif" panose="020B0604020202020204" pitchFamily="34" charset="0"/>
+                <a:ea typeface="Microsoft Sans Serif" panose="020B0604020202020204" pitchFamily="34" charset="0"/>
+                <a:cs typeface="Microsoft Sans Serif" panose="020B0604020202020204" pitchFamily="34" charset="0"/>
+              </a:rPr>
+              <a:t>Sortie Serial</a:t>
+            </a:r>
+          </a:p>
+        </p:txBody>
+      </p:sp>
+      <p:sp>
+        <p:nvSpPr>
+          <p:cNvPr id="21" name="Rectangle 20">
+            <a:extLst>
+              <a:ext uri="{FF2B5EF4-FFF2-40B4-BE49-F238E27FC236}">
+                <a16:creationId xmlns:a16="http://schemas.microsoft.com/office/drawing/2014/main" id="{98205717-9668-4FF6-9029-453B38815A65}"/>
+              </a:ext>
+            </a:extLst>
+          </p:cNvPr>
+          <p:cNvSpPr/>
+          <p:nvPr/>
+        </p:nvSpPr>
+        <p:spPr>
+          <a:xfrm>
+            <a:off x="5435901" y="4705350"/>
+            <a:ext cx="1498701" cy="313233"/>
+          </a:xfrm>
+          <a:prstGeom prst="rect">
+            <a:avLst/>
+          </a:prstGeom>
+          <a:noFill/>
+        </p:spPr>
+        <p:style>
+          <a:lnRef idx="2">
+            <a:schemeClr val="accent1">
+              <a:shade val="50000"/>
+            </a:schemeClr>
+          </a:lnRef>
+          <a:fillRef idx="1">
+            <a:schemeClr val="accent1"/>
+          </a:fillRef>
+          <a:effectRef idx="0">
+            <a:schemeClr val="accent1"/>
+          </a:effectRef>
+          <a:fontRef idx="minor">
+            <a:schemeClr val="lt1"/>
+          </a:fontRef>
+        </p:style>
+        <p:txBody>
+          <a:bodyPr rtlCol="0" anchor="ctr"/>
+          <a:lstStyle/>
+          <a:p>
+            <a:pPr algn="ctr"/>
+            <a:endParaRPr lang="fr-FR"/>
+          </a:p>
+        </p:txBody>
+      </p:sp>
+      <p:sp>
+        <p:nvSpPr>
+          <p:cNvPr id="22" name="ZoneTexte 21">
+            <a:extLst>
+              <a:ext uri="{FF2B5EF4-FFF2-40B4-BE49-F238E27FC236}">
+                <a16:creationId xmlns:a16="http://schemas.microsoft.com/office/drawing/2014/main" id="{34452539-8DFB-41DD-94AB-C85FA59DA1B4}"/>
+              </a:ext>
+            </a:extLst>
+          </p:cNvPr>
+          <p:cNvSpPr txBox="1"/>
+          <p:nvPr/>
+        </p:nvSpPr>
+        <p:spPr>
+          <a:xfrm>
+            <a:off x="5426333" y="4686338"/>
+            <a:ext cx="1498701" cy="369332"/>
+          </a:xfrm>
+          <a:prstGeom prst="rect">
+            <a:avLst/>
+          </a:prstGeom>
+          <a:noFill/>
+        </p:spPr>
+        <p:txBody>
+          <a:bodyPr wrap="square" rtlCol="0">
+            <a:spAutoFit/>
+          </a:bodyPr>
+          <a:lstStyle/>
+          <a:p>
+            <a:pPr algn="ctr"/>
+            <a:r>
+              <a:rPr lang="fr-FR" b="1" dirty="0">
+                <a:effectLst>
+                  <a:outerShdw blurRad="38100" dist="38100" dir="2700000" algn="tl">
+                    <a:srgbClr val="000000">
+                      <a:alpha val="43137"/>
+                    </a:srgbClr>
+                  </a:outerShdw>
+                </a:effectLst>
+                <a:latin typeface="Microsoft Sans Serif" panose="020B0604020202020204" pitchFamily="34" charset="0"/>
+                <a:ea typeface="Microsoft Sans Serif" panose="020B0604020202020204" pitchFamily="34" charset="0"/>
+                <a:cs typeface="Microsoft Sans Serif" panose="020B0604020202020204" pitchFamily="34" charset="0"/>
+              </a:rPr>
+              <a:t>Fichier CSV</a:t>
+            </a:r>
+          </a:p>
+        </p:txBody>
+      </p:sp>
+      <p:sp>
+        <p:nvSpPr>
+          <p:cNvPr id="26" name="Rectangle 25">
+            <a:extLst>
+              <a:ext uri="{FF2B5EF4-FFF2-40B4-BE49-F238E27FC236}">
+                <a16:creationId xmlns:a16="http://schemas.microsoft.com/office/drawing/2014/main" id="{0049B1BF-8425-4783-BCBC-CB56E39CFD36}"/>
+              </a:ext>
+            </a:extLst>
+          </p:cNvPr>
+          <p:cNvSpPr/>
+          <p:nvPr/>
+        </p:nvSpPr>
+        <p:spPr>
+          <a:xfrm>
+            <a:off x="5385456" y="1974221"/>
+            <a:ext cx="1549146" cy="361950"/>
+          </a:xfrm>
+          <a:prstGeom prst="rect">
+            <a:avLst/>
+          </a:prstGeom>
+          <a:noFill/>
+        </p:spPr>
+        <p:style>
+          <a:lnRef idx="2">
+            <a:schemeClr val="accent1">
+              <a:shade val="50000"/>
+            </a:schemeClr>
+          </a:lnRef>
+          <a:fillRef idx="1">
+            <a:schemeClr val="accent1"/>
+          </a:fillRef>
+          <a:effectRef idx="0">
+            <a:schemeClr val="accent1"/>
+          </a:effectRef>
+          <a:fontRef idx="minor">
+            <a:schemeClr val="lt1"/>
+          </a:fontRef>
+        </p:style>
+        <p:txBody>
+          <a:bodyPr rtlCol="0" anchor="ctr"/>
+          <a:lstStyle/>
+          <a:p>
+            <a:pPr algn="ctr"/>
+            <a:endParaRPr lang="fr-FR"/>
+          </a:p>
+        </p:txBody>
+      </p:sp>
+      <p:sp>
+        <p:nvSpPr>
+          <p:cNvPr id="27" name="ZoneTexte 26">
+            <a:extLst>
+              <a:ext uri="{FF2B5EF4-FFF2-40B4-BE49-F238E27FC236}">
+                <a16:creationId xmlns:a16="http://schemas.microsoft.com/office/drawing/2014/main" id="{58697CF2-762A-4CAD-8673-0FDDFA6BC39F}"/>
+              </a:ext>
+            </a:extLst>
+          </p:cNvPr>
+          <p:cNvSpPr txBox="1"/>
+          <p:nvPr/>
+        </p:nvSpPr>
+        <p:spPr>
+          <a:xfrm>
+            <a:off x="5377972" y="1974221"/>
+            <a:ext cx="1513556" cy="369332"/>
+          </a:xfrm>
+          <a:prstGeom prst="rect">
+            <a:avLst/>
+          </a:prstGeom>
+          <a:noFill/>
+        </p:spPr>
+        <p:txBody>
+          <a:bodyPr wrap="square" rtlCol="0">
+            <a:spAutoFit/>
+          </a:bodyPr>
+          <a:lstStyle/>
+          <a:p>
+            <a:pPr algn="ctr"/>
+            <a:r>
+              <a:rPr lang="fr-FR" b="1" dirty="0">
+                <a:effectLst>
+                  <a:outerShdw blurRad="38100" dist="38100" dir="2700000" algn="tl">
+                    <a:srgbClr val="000000">
+                      <a:alpha val="43137"/>
+                    </a:srgbClr>
+                  </a:outerShdw>
+                </a:effectLst>
+                <a:latin typeface="Microsoft Sans Serif" panose="020B0604020202020204" pitchFamily="34" charset="0"/>
+                <a:ea typeface="Microsoft Sans Serif" panose="020B0604020202020204" pitchFamily="34" charset="0"/>
+                <a:cs typeface="Microsoft Sans Serif" panose="020B0604020202020204" pitchFamily="34" charset="0"/>
+              </a:rPr>
+              <a:t>Visualisation</a:t>
+            </a:r>
+          </a:p>
+        </p:txBody>
+      </p:sp>
     </p:spTree>
     <p:extLst>
       <p:ext uri="{BB962C8B-B14F-4D97-AF65-F5344CB8AC3E}">

</xml_diff>

<commit_message>
manque plus que module 4
</commit_message>
<xml_diff>
--- a/PROJET 1 UE 1 diapositive.pptx
+++ b/PROJET 1 UE 1 diapositive.pptx
@@ -14,9 +14,8 @@
     <p:sldId id="263" r:id="rId8"/>
     <p:sldId id="267" r:id="rId9"/>
     <p:sldId id="268" r:id="rId10"/>
-    <p:sldId id="265" r:id="rId11"/>
-    <p:sldId id="264" r:id="rId12"/>
-    <p:sldId id="266" r:id="rId13"/>
+    <p:sldId id="264" r:id="rId11"/>
+    <p:sldId id="266" r:id="rId12"/>
   </p:sldIdLst>
   <p:sldSz cx="12192000" cy="6858000"/>
   <p:notesSz cx="6858000" cy="9144000"/>
@@ -148,29 +147,6 @@
 
 <file path=ppt/revisionInfo.xml><?xml version="1.0" encoding="utf-8"?>
 <p1510:revInfo xmlns:a="http://schemas.openxmlformats.org/drawingml/2006/main" xmlns:r="http://schemas.openxmlformats.org/officeDocument/2006/relationships" xmlns:p1510="http://schemas.microsoft.com/office/powerpoint/2015/10/main"/>
-</file>
-
-<file path=ppt/comments/comment1.xml><?xml version="1.0" encoding="utf-8"?>
-<p:cmLst xmlns:a="http://schemas.openxmlformats.org/drawingml/2006/main" xmlns:r="http://schemas.openxmlformats.org/officeDocument/2006/relationships" xmlns:p="http://schemas.openxmlformats.org/presentationml/2006/main">
-  <p:cm authorId="1" dt="2017-11-19T18:29:17.447" idx="1">
-    <p:pos x="10" y="10"/>
-    <p:text/>
-    <p:extLst>
-      <p:ext uri="{C676402C-5697-4E1C-873F-D02D1690AC5C}">
-        <p15:threadingInfo xmlns:p15="http://schemas.microsoft.com/office/powerpoint/2012/main" timeZoneBias="-60"/>
-      </p:ext>
-    </p:extLst>
-  </p:cm>
-  <p:cm authorId="1" dt="2017-11-19T18:29:18.808" idx="2">
-    <p:pos x="146" y="146"/>
-    <p:text/>
-    <p:extLst>
-      <p:ext uri="{C676402C-5697-4E1C-873F-D02D1690AC5C}">
-        <p15:threadingInfo xmlns:p15="http://schemas.microsoft.com/office/powerpoint/2012/main" timeZoneBias="-60"/>
-      </p:ext>
-    </p:extLst>
-  </p:cm>
-</p:cmLst>
 </file>
 
 <file path=ppt/slideLayouts/slideLayout1.xml><?xml version="1.0" encoding="utf-8"?>
@@ -3704,291 +3680,38 @@
           <a:chExt cx="0" cy="0"/>
         </a:xfrm>
       </p:grpSpPr>
-      <p:grpSp>
-        <p:nvGrpSpPr>
-          <p:cNvPr id="4" name="Groupe 3">
-            <a:extLst>
-              <a:ext uri="{FF2B5EF4-FFF2-40B4-BE49-F238E27FC236}">
-                <a16:creationId xmlns:a16="http://schemas.microsoft.com/office/drawing/2014/main" id="{081DB0A4-63FE-4873-B3DA-7D5352C360A3}"/>
-              </a:ext>
-            </a:extLst>
-          </p:cNvPr>
-          <p:cNvGrpSpPr/>
-          <p:nvPr/>
-        </p:nvGrpSpPr>
-        <p:grpSpPr>
-          <a:xfrm>
-            <a:off x="9680418" y="783893"/>
-            <a:ext cx="2451723" cy="5554831"/>
-            <a:chOff x="9680418" y="783893"/>
-            <a:chExt cx="2451723" cy="5554831"/>
-          </a:xfrm>
-        </p:grpSpPr>
-        <p:sp>
-          <p:nvSpPr>
-            <p:cNvPr id="5" name="ZoneTexte 4">
-              <a:extLst>
-                <a:ext uri="{FF2B5EF4-FFF2-40B4-BE49-F238E27FC236}">
-                  <a16:creationId xmlns:a16="http://schemas.microsoft.com/office/drawing/2014/main" id="{A4ABC17C-FEDE-40CA-9BA8-AF91D79859F8}"/>
-                </a:ext>
-              </a:extLst>
-            </p:cNvPr>
-            <p:cNvSpPr txBox="1"/>
-            <p:nvPr/>
-          </p:nvSpPr>
-          <p:spPr>
-            <a:xfrm>
-              <a:off x="9758713" y="783893"/>
-              <a:ext cx="2373428" cy="2985433"/>
-            </a:xfrm>
-            <a:prstGeom prst="rect">
-              <a:avLst/>
-            </a:prstGeom>
-            <a:noFill/>
-          </p:spPr>
-          <p:txBody>
-            <a:bodyPr wrap="square" rtlCol="0">
-              <a:spAutoFit/>
-            </a:bodyPr>
-            <a:lstStyle/>
-            <a:p>
-              <a:r>
-                <a:rPr lang="fr-FR" sz="1200" dirty="0"/>
-                <a:t>Avancement Diapositive:</a:t>
-              </a:r>
-            </a:p>
-            <a:p>
-              <a:pPr marL="400050" indent="-400050">
-                <a:buAutoNum type="romanUcParenR"/>
-              </a:pPr>
-              <a:endParaRPr lang="fr-FR" sz="1200" b="1" dirty="0"/>
-            </a:p>
-            <a:p>
-              <a:pPr marL="400050" indent="-400050">
-                <a:buAutoNum type="romanUcParenR"/>
-              </a:pPr>
-              <a:endParaRPr lang="fr-FR" sz="1200" b="1" dirty="0"/>
-            </a:p>
-            <a:p>
-              <a:pPr marL="400050" indent="-400050">
-                <a:buAutoNum type="romanUcParenR"/>
-              </a:pPr>
-              <a:r>
-                <a:rPr lang="fr-FR" sz="1200" i="1" dirty="0"/>
-                <a:t>Organisation du projet</a:t>
-              </a:r>
-            </a:p>
-            <a:p>
-              <a:pPr marL="400050" indent="-400050">
-                <a:buAutoNum type="romanUcParenR"/>
-              </a:pPr>
-              <a:endParaRPr lang="fr-FR" sz="1200" dirty="0"/>
-            </a:p>
-            <a:p>
-              <a:pPr marL="400050" indent="-400050">
-                <a:buAutoNum type="romanUcParenR"/>
-              </a:pPr>
-              <a:r>
-                <a:rPr lang="fr-FR" sz="1200" i="1" dirty="0"/>
-                <a:t>Présentation des modules</a:t>
-              </a:r>
-            </a:p>
-            <a:p>
-              <a:pPr marL="971550" lvl="1" indent="-514350">
-                <a:buFont typeface="+mj-lt"/>
-                <a:buAutoNum type="alphaLcParenR"/>
-              </a:pPr>
-              <a:r>
-                <a:rPr lang="fr-FR" sz="1100" i="1" dirty="0"/>
-                <a:t>Module 1</a:t>
-              </a:r>
-            </a:p>
-            <a:p>
-              <a:pPr marL="971550" lvl="1" indent="-514350">
-                <a:buFont typeface="+mj-lt"/>
-                <a:buAutoNum type="alphaLcParenR"/>
-              </a:pPr>
-              <a:r>
-                <a:rPr lang="fr-FR" sz="1100" i="1" dirty="0"/>
-                <a:t>Module 2</a:t>
-              </a:r>
-            </a:p>
-            <a:p>
-              <a:pPr marL="971550" lvl="1" indent="-514350">
-                <a:buFont typeface="+mj-lt"/>
-                <a:buAutoNum type="alphaLcParenR"/>
-              </a:pPr>
-              <a:r>
-                <a:rPr lang="fr-FR" sz="1100" i="1" dirty="0"/>
-                <a:t>Module 3</a:t>
-              </a:r>
-            </a:p>
-            <a:p>
-              <a:pPr marL="971550" lvl="1" indent="-514350">
-                <a:buFont typeface="+mj-lt"/>
-                <a:buAutoNum type="alphaLcParenR"/>
-              </a:pPr>
-              <a:r>
-                <a:rPr lang="fr-FR" sz="1100" i="1" dirty="0"/>
-                <a:t>Module 4</a:t>
-              </a:r>
-            </a:p>
-            <a:p>
-              <a:pPr lvl="1"/>
-              <a:endParaRPr lang="fr-FR" sz="1200" i="1" dirty="0"/>
-            </a:p>
-            <a:p>
-              <a:pPr marL="400050" indent="-400050">
-                <a:buAutoNum type="romanUcParenR"/>
-              </a:pPr>
-              <a:r>
-                <a:rPr lang="fr-FR" sz="1200" b="1" dirty="0"/>
-                <a:t>Bilan des modules</a:t>
-              </a:r>
-            </a:p>
-            <a:p>
-              <a:pPr marL="400050" indent="-400050">
-                <a:buAutoNum type="romanUcParenR"/>
-              </a:pPr>
-              <a:endParaRPr lang="fr-FR" sz="1200" b="1" i="1" dirty="0"/>
-            </a:p>
-            <a:p>
-              <a:pPr marL="400050" indent="-400050">
-                <a:buAutoNum type="romanUcParenR"/>
-              </a:pPr>
-              <a:r>
-                <a:rPr lang="fr-FR" sz="1200" i="1" dirty="0"/>
-                <a:t>Visualisation direct du projet</a:t>
-              </a:r>
-            </a:p>
-            <a:p>
-              <a:pPr marL="400050" indent="-400050">
-                <a:buAutoNum type="romanUcParenR"/>
-              </a:pPr>
-              <a:endParaRPr lang="fr-FR" sz="1200" dirty="0"/>
-            </a:p>
-            <a:p>
-              <a:pPr marL="400050" indent="-400050">
-                <a:buAutoNum type="romanUcParenR"/>
-              </a:pPr>
-              <a:r>
-                <a:rPr lang="fr-FR" sz="1200" i="1" dirty="0"/>
-                <a:t>Conclusion</a:t>
-              </a:r>
-            </a:p>
-          </p:txBody>
-        </p:sp>
-        <p:sp>
-          <p:nvSpPr>
-            <p:cNvPr id="6" name="Rectangle 5">
-              <a:extLst>
-                <a:ext uri="{FF2B5EF4-FFF2-40B4-BE49-F238E27FC236}">
-                  <a16:creationId xmlns:a16="http://schemas.microsoft.com/office/drawing/2014/main" id="{56E222FE-3FE3-496C-827B-FC0161402FFE}"/>
-                </a:ext>
-              </a:extLst>
-            </p:cNvPr>
-            <p:cNvSpPr/>
-            <p:nvPr/>
-          </p:nvSpPr>
-          <p:spPr>
-            <a:xfrm>
-              <a:off x="9680418" y="783893"/>
-              <a:ext cx="2379215" cy="5554831"/>
-            </a:xfrm>
-            <a:prstGeom prst="rect">
-              <a:avLst/>
-            </a:prstGeom>
-            <a:noFill/>
-            <a:ln>
-              <a:solidFill>
-                <a:schemeClr val="tx1"/>
-              </a:solidFill>
-            </a:ln>
-          </p:spPr>
-          <p:style>
-            <a:lnRef idx="2">
-              <a:schemeClr val="accent1">
-                <a:shade val="50000"/>
-              </a:schemeClr>
-            </a:lnRef>
-            <a:fillRef idx="1">
-              <a:schemeClr val="accent1"/>
-            </a:fillRef>
-            <a:effectRef idx="0">
-              <a:schemeClr val="accent1"/>
-            </a:effectRef>
-            <a:fontRef idx="minor">
-              <a:schemeClr val="lt1"/>
-            </a:fontRef>
-          </p:style>
-          <p:txBody>
-            <a:bodyPr rtlCol="0" anchor="ctr"/>
-            <a:lstStyle/>
-            <a:p>
-              <a:pPr algn="ctr"/>
-              <a:endParaRPr lang="fr-FR" dirty="0"/>
-            </a:p>
-          </p:txBody>
-        </p:sp>
-      </p:grpSp>
       <p:sp>
         <p:nvSpPr>
-          <p:cNvPr id="8" name="Titre 1">
-            <a:extLst>
-              <a:ext uri="{FF2B5EF4-FFF2-40B4-BE49-F238E27FC236}">
-                <a16:creationId xmlns:a16="http://schemas.microsoft.com/office/drawing/2014/main" id="{94FF983A-041B-496B-976A-2CBBCAFABE25}"/>
-              </a:ext>
-            </a:extLst>
-          </p:cNvPr>
-          <p:cNvSpPr txBox="1">
-            <a:spLocks/>
+          <p:cNvPr id="2" name="Titre 1">
+            <a:extLst>
+              <a:ext uri="{FF2B5EF4-FFF2-40B4-BE49-F238E27FC236}">
+                <a16:creationId xmlns:a16="http://schemas.microsoft.com/office/drawing/2014/main" id="{3DE045EF-6B6A-4766-812D-EC4BD0F4B1CB}"/>
+              </a:ext>
+            </a:extLst>
+          </p:cNvPr>
+          <p:cNvSpPr>
+            <a:spLocks noGrp="1"/>
           </p:cNvSpPr>
-          <p:nvPr/>
+          <p:nvPr>
+            <p:ph type="title"/>
+          </p:nvPr>
         </p:nvSpPr>
         <p:spPr>
           <a:xfrm>
-            <a:off x="-376634" y="65148"/>
-            <a:ext cx="10515600" cy="1325563"/>
+            <a:off x="1104530" y="2766218"/>
+            <a:ext cx="9726227" cy="1325563"/>
           </a:xfrm>
-          <a:prstGeom prst="rect">
-            <a:avLst/>
-          </a:prstGeom>
         </p:spPr>
         <p:txBody>
-          <a:bodyPr vert="horz" lIns="91440" tIns="45720" rIns="91440" bIns="45720" rtlCol="0" anchor="ctr">
+          <a:bodyPr>
             <a:normAutofit/>
           </a:bodyPr>
-          <a:lstStyle>
-            <a:lvl1pPr algn="l" defTabSz="914400" rtl="0" eaLnBrk="1" latinLnBrk="0" hangingPunct="1">
-              <a:lnSpc>
-                <a:spcPct val="90000"/>
-              </a:lnSpc>
-              <a:spcBef>
-                <a:spcPct val="0"/>
-              </a:spcBef>
-              <a:buNone/>
-              <a:defRPr sz="4400" kern="1200">
-                <a:solidFill>
-                  <a:schemeClr val="tx1"/>
-                </a:solidFill>
-                <a:latin typeface="+mj-lt"/>
-                <a:ea typeface="+mj-ea"/>
-                <a:cs typeface="+mj-cs"/>
-              </a:defRPr>
-            </a:lvl1pPr>
-          </a:lstStyle>
+          <a:lstStyle/>
           <a:p>
             <a:pPr algn="ctr"/>
             <a:r>
               <a:rPr lang="fr-FR" sz="4000" dirty="0"/>
-              <a:t> III) Bilan des modules </a:t>
-            </a:r>
-          </a:p>
-          <a:p>
-            <a:pPr algn="ctr"/>
-            <a:r>
-              <a:rPr lang="fr-FR" sz="3200" dirty="0"/>
-              <a:t>Vision critique Avantages/ Inconvénients</a:t>
+              <a:t>IV) Démonstration des modules</a:t>
             </a:r>
           </a:p>
         </p:txBody>
@@ -3996,7 +3719,7 @@
     </p:spTree>
     <p:extLst>
       <p:ext uri="{BB962C8B-B14F-4D97-AF65-F5344CB8AC3E}">
-        <p14:creationId xmlns:p14="http://schemas.microsoft.com/office/powerpoint/2010/main" val="1965814407"/>
+        <p14:creationId xmlns:p14="http://schemas.microsoft.com/office/powerpoint/2010/main" val="615297589"/>
       </p:ext>
     </p:extLst>
   </p:cSld>
@@ -4028,72 +3751,6 @@
           <p:cNvPr id="2" name="Titre 1">
             <a:extLst>
               <a:ext uri="{FF2B5EF4-FFF2-40B4-BE49-F238E27FC236}">
-                <a16:creationId xmlns:a16="http://schemas.microsoft.com/office/drawing/2014/main" id="{3DE045EF-6B6A-4766-812D-EC4BD0F4B1CB}"/>
-              </a:ext>
-            </a:extLst>
-          </p:cNvPr>
-          <p:cNvSpPr>
-            <a:spLocks noGrp="1"/>
-          </p:cNvSpPr>
-          <p:nvPr>
-            <p:ph type="title"/>
-          </p:nvPr>
-        </p:nvSpPr>
-        <p:spPr>
-          <a:xfrm>
-            <a:off x="1104530" y="2766218"/>
-            <a:ext cx="9726227" cy="1325563"/>
-          </a:xfrm>
-        </p:spPr>
-        <p:txBody>
-          <a:bodyPr>
-            <a:normAutofit/>
-          </a:bodyPr>
-          <a:lstStyle/>
-          <a:p>
-            <a:pPr algn="ctr"/>
-            <a:r>
-              <a:rPr lang="fr-FR" sz="4000" dirty="0"/>
-              <a:t>IV) Présentation direct ou vidéo du projet </a:t>
-            </a:r>
-          </a:p>
-        </p:txBody>
-      </p:sp>
-    </p:spTree>
-    <p:extLst>
-      <p:ext uri="{BB962C8B-B14F-4D97-AF65-F5344CB8AC3E}">
-        <p14:creationId xmlns:p14="http://schemas.microsoft.com/office/powerpoint/2010/main" val="615297589"/>
-      </p:ext>
-    </p:extLst>
-  </p:cSld>
-  <p:clrMapOvr>
-    <a:masterClrMapping/>
-  </p:clrMapOvr>
-</p:sld>
-</file>
-
-<file path=ppt/slides/slide12.xml><?xml version="1.0" encoding="utf-8"?>
-<p:sld xmlns:a="http://schemas.openxmlformats.org/drawingml/2006/main" xmlns:r="http://schemas.openxmlformats.org/officeDocument/2006/relationships" xmlns:p="http://schemas.openxmlformats.org/presentationml/2006/main">
-  <p:cSld>
-    <p:spTree>
-      <p:nvGrpSpPr>
-        <p:cNvPr id="1" name=""/>
-        <p:cNvGrpSpPr/>
-        <p:nvPr/>
-      </p:nvGrpSpPr>
-      <p:grpSpPr>
-        <a:xfrm>
-          <a:off x="0" y="0"/>
-          <a:ext cx="0" cy="0"/>
-          <a:chOff x="0" y="0"/>
-          <a:chExt cx="0" cy="0"/>
-        </a:xfrm>
-      </p:grpSpPr>
-      <p:sp>
-        <p:nvSpPr>
-          <p:cNvPr id="2" name="Titre 1">
-            <a:extLst>
-              <a:ext uri="{FF2B5EF4-FFF2-40B4-BE49-F238E27FC236}">
                 <a16:creationId xmlns:a16="http://schemas.microsoft.com/office/drawing/2014/main" id="{457EB037-F01F-47A7-B5F5-983C07B919BC}"/>
               </a:ext>
             </a:extLst>
@@ -4152,15 +3809,11 @@
               <a:rPr lang="fr-FR" sz="4000" dirty="0"/>
             </a:br>
             <a:br>
-              <a:rPr lang="fr-FR" sz="4000"/>
+              <a:rPr lang="fr-FR" sz="4000" dirty="0"/>
             </a:br>
             <a:r>
-              <a:rPr lang="fr-FR" sz="4000"/>
-              <a:t>Des Questions</a:t>
-            </a:r>
-            <a:r>
               <a:rPr lang="fr-FR" sz="4000" dirty="0"/>
-              <a:t>? </a:t>
+              <a:t>			Des Questions? </a:t>
             </a:r>
           </a:p>
         </p:txBody>
@@ -4680,8 +4333,8 @@
         </p:nvSpPr>
         <p:spPr>
           <a:xfrm>
-            <a:off x="1563210" y="1690688"/>
-            <a:ext cx="8752642" cy="5201424"/>
+            <a:off x="1719679" y="1722338"/>
+            <a:ext cx="8752642" cy="4770537"/>
           </a:xfrm>
           <a:prstGeom prst="rect">
             <a:avLst/>
@@ -4803,30 +4456,14 @@
               <a:buAutoNum type="romanUcParenR"/>
             </a:pPr>
             <a:r>
-              <a:rPr lang="fr-FR" sz="2800" dirty="0">
-                <a:latin typeface="+mj-lt"/>
-              </a:rPr>
-              <a:t>Visualisation direct du Projet</a:t>
-            </a:r>
-          </a:p>
-          <a:p>
-            <a:pPr marL="400050" indent="-400050">
-              <a:buAutoNum type="romanUcParenR"/>
-            </a:pPr>
+              <a:rPr lang="fr-FR" sz="2800" i="1" dirty="0"/>
+              <a:t>Démonstration des modules</a:t>
+            </a:r>
+          </a:p>
+          <a:p>
             <a:endParaRPr lang="fr-FR" sz="2800" dirty="0">
               <a:latin typeface="+mj-lt"/>
             </a:endParaRPr>
-          </a:p>
-          <a:p>
-            <a:pPr marL="400050" indent="-400050">
-              <a:buAutoNum type="romanUcParenR"/>
-            </a:pPr>
-            <a:r>
-              <a:rPr lang="fr-FR" sz="2800" dirty="0">
-                <a:latin typeface="+mj-lt"/>
-              </a:rPr>
-              <a:t>Conclusion</a:t>
-            </a:r>
           </a:p>
         </p:txBody>
       </p:sp>
@@ -5528,7 +5165,7 @@
           <p:spPr>
             <a:xfrm>
               <a:off x="9758713" y="783893"/>
-              <a:ext cx="2373428" cy="2985433"/>
+              <a:ext cx="2373428" cy="2800767"/>
             </a:xfrm>
             <a:prstGeom prst="rect">
               <a:avLst/>
@@ -5645,28 +5282,15 @@
             </a:p>
             <a:p>
               <a:pPr marL="400050" indent="-400050">
-                <a:buFontTx/>
                 <a:buAutoNum type="romanUcParenR"/>
               </a:pPr>
               <a:r>
                 <a:rPr lang="fr-FR" sz="1200" i="1" dirty="0"/>
-                <a:t>Visualisation direct du projet</a:t>
+                <a:t>Démonstration des modules</a:t>
               </a:r>
             </a:p>
             <a:p>
-              <a:pPr marL="400050" indent="-400050">
-                <a:buAutoNum type="romanUcParenR"/>
-              </a:pPr>
               <a:endParaRPr lang="fr-FR" sz="1200" i="1" dirty="0"/>
-            </a:p>
-            <a:p>
-              <a:pPr marL="400050" indent="-400050">
-                <a:buAutoNum type="romanUcParenR"/>
-              </a:pPr>
-              <a:r>
-                <a:rPr lang="fr-FR" sz="1200" i="1" dirty="0"/>
-                <a:t>Conclusion</a:t>
-              </a:r>
             </a:p>
           </p:txBody>
         </p:sp>
@@ -5899,7 +5523,7 @@
           <p:spPr>
             <a:xfrm>
               <a:off x="9758713" y="783893"/>
-              <a:ext cx="2373428" cy="2985433"/>
+              <a:ext cx="2373428" cy="2800767"/>
             </a:xfrm>
             <a:prstGeom prst="rect">
               <a:avLst/>
@@ -6025,19 +5649,7 @@
               </a:r>
             </a:p>
             <a:p>
-              <a:pPr marL="400050" indent="-400050">
-                <a:buAutoNum type="romanUcParenR"/>
-              </a:pPr>
               <a:endParaRPr lang="fr-FR" sz="1200" i="1" dirty="0"/>
-            </a:p>
-            <a:p>
-              <a:pPr marL="400050" indent="-400050">
-                <a:buAutoNum type="romanUcParenR"/>
-              </a:pPr>
-              <a:r>
-                <a:rPr lang="fr-FR" sz="1200" i="1" dirty="0"/>
-                <a:t>Conclusion</a:t>
-              </a:r>
             </a:p>
           </p:txBody>
         </p:sp>
@@ -6360,7 +5972,7 @@
           <p:spPr>
             <a:xfrm>
               <a:off x="9758713" y="783893"/>
-              <a:ext cx="2373428" cy="2985433"/>
+              <a:ext cx="2373428" cy="2800767"/>
             </a:xfrm>
             <a:prstGeom prst="rect">
               <a:avLst/>
@@ -6477,28 +6089,15 @@
             </a:p>
             <a:p>
               <a:pPr marL="400050" indent="-400050">
-                <a:buFontTx/>
                 <a:buAutoNum type="romanUcParenR"/>
               </a:pPr>
               <a:r>
                 <a:rPr lang="fr-FR" sz="1200" i="1" dirty="0"/>
-                <a:t>Visualisation direct du projet</a:t>
+                <a:t>Démonstration des modules</a:t>
               </a:r>
             </a:p>
             <a:p>
-              <a:pPr marL="400050" indent="-400050">
-                <a:buAutoNum type="romanUcParenR"/>
-              </a:pPr>
               <a:endParaRPr lang="fr-FR" sz="1200" i="1" dirty="0"/>
-            </a:p>
-            <a:p>
-              <a:pPr marL="400050" indent="-400050">
-                <a:buAutoNum type="romanUcParenR"/>
-              </a:pPr>
-              <a:r>
-                <a:rPr lang="fr-FR" sz="1200" i="1" dirty="0"/>
-                <a:t>Conclusion</a:t>
-              </a:r>
             </a:p>
           </p:txBody>
         </p:sp>
@@ -6682,7 +6281,7 @@
           <p:spPr>
             <a:xfrm>
               <a:off x="9758713" y="783893"/>
-              <a:ext cx="2373428" cy="2985433"/>
+              <a:ext cx="2373428" cy="2800767"/>
             </a:xfrm>
             <a:prstGeom prst="rect">
               <a:avLst/>
@@ -6799,28 +6398,15 @@
             </a:p>
             <a:p>
               <a:pPr marL="400050" indent="-400050">
-                <a:buFontTx/>
                 <a:buAutoNum type="romanUcParenR"/>
               </a:pPr>
               <a:r>
                 <a:rPr lang="fr-FR" sz="1200" i="1" dirty="0"/>
-                <a:t>Visualisation direct du projet</a:t>
+                <a:t>Démonstration des modules</a:t>
               </a:r>
             </a:p>
             <a:p>
-              <a:pPr marL="400050" indent="-400050">
-                <a:buAutoNum type="romanUcParenR"/>
-              </a:pPr>
               <a:endParaRPr lang="fr-FR" sz="1200" i="1" dirty="0"/>
-            </a:p>
-            <a:p>
-              <a:pPr marL="400050" indent="-400050">
-                <a:buAutoNum type="romanUcParenR"/>
-              </a:pPr>
-              <a:r>
-                <a:rPr lang="fr-FR" sz="1200" i="1" dirty="0"/>
-                <a:t>Conclusion</a:t>
-              </a:r>
             </a:p>
           </p:txBody>
         </p:sp>
@@ -6990,7 +6576,7 @@
         <p:spPr>
           <a:xfrm>
             <a:off x="3906175" y="1899821"/>
-            <a:ext cx="2219418" cy="923330"/>
+            <a:ext cx="2219418" cy="1477328"/>
           </a:xfrm>
           <a:prstGeom prst="rect">
             <a:avLst/>
@@ -7004,10 +6590,10 @@
           <a:lstStyle/>
           <a:p>
             <a:r>
-              <a:rPr lang="fr-FR" dirty="0" err="1"/>
+              <a:rPr lang="fr-FR" b="1" dirty="0" err="1"/>
               <a:t>Processing</a:t>
             </a:r>
-            <a:endParaRPr lang="fr-FR" dirty="0"/>
+            <a:endParaRPr lang="fr-FR" b="1" dirty="0"/>
           </a:p>
           <a:p>
             <a:endParaRPr lang="fr-FR" dirty="0"/>
@@ -7016,6 +6602,15 @@
             <a:r>
               <a:rPr lang="fr-FR" dirty="0"/>
               <a:t>Interface Arduino/PC</a:t>
+            </a:r>
+          </a:p>
+          <a:p>
+            <a:endParaRPr lang="fr-FR" dirty="0"/>
+          </a:p>
+          <a:p>
+            <a:r>
+              <a:rPr lang="fr-FR" dirty="0"/>
+              <a:t>Fichier CSV</a:t>
             </a:r>
           </a:p>
         </p:txBody>
@@ -7298,10 +6893,10 @@
         </p:nvGrpSpPr>
         <p:grpSpPr>
           <a:xfrm>
-            <a:off x="9680418" y="783893"/>
-            <a:ext cx="2451723" cy="5554831"/>
+            <a:off x="9704767" y="837159"/>
+            <a:ext cx="2379215" cy="5554831"/>
             <a:chOff x="9680418" y="783893"/>
-            <a:chExt cx="2451723" cy="5554831"/>
+            <a:chExt cx="2379215" cy="5554831"/>
           </a:xfrm>
         </p:grpSpPr>
         <p:sp>
@@ -7318,8 +6913,8 @@
           </p:nvSpPr>
           <p:spPr>
             <a:xfrm>
-              <a:off x="9758713" y="783893"/>
-              <a:ext cx="2373428" cy="2985433"/>
+              <a:off x="9686205" y="945207"/>
+              <a:ext cx="2373428" cy="2616101"/>
             </a:xfrm>
             <a:prstGeom prst="rect">
               <a:avLst/>
@@ -7432,32 +7027,13 @@
               <a:pPr marL="400050" indent="-400050">
                 <a:buAutoNum type="romanUcParenR"/>
               </a:pPr>
-              <a:endParaRPr lang="fr-FR" sz="1200" i="1" dirty="0"/>
-            </a:p>
-            <a:p>
-              <a:pPr marL="400050" indent="-400050">
-                <a:buFontTx/>
-                <a:buAutoNum type="romanUcParenR"/>
-              </a:pPr>
               <a:r>
                 <a:rPr lang="fr-FR" sz="1200" i="1" dirty="0"/>
-                <a:t>Visualisation direct du projet</a:t>
+                <a:t>Démonstration des modules</a:t>
               </a:r>
             </a:p>
             <a:p>
-              <a:pPr marL="400050" indent="-400050">
-                <a:buAutoNum type="romanUcParenR"/>
-              </a:pPr>
               <a:endParaRPr lang="fr-FR" sz="1200" i="1" dirty="0"/>
-            </a:p>
-            <a:p>
-              <a:pPr marL="400050" indent="-400050">
-                <a:buAutoNum type="romanUcParenR"/>
-              </a:pPr>
-              <a:r>
-                <a:rPr lang="fr-FR" sz="1200" i="1" dirty="0"/>
-                <a:t>Conclusion</a:t>
-              </a:r>
             </a:p>
           </p:txBody>
         </p:sp>
@@ -7620,7 +7196,7 @@
         </p:nvGrpSpPr>
         <p:grpSpPr>
           <a:xfrm>
-            <a:off x="555192" y="1433374"/>
+            <a:off x="627700" y="1433374"/>
             <a:ext cx="8651948" cy="5071769"/>
             <a:chOff x="1867769" y="1445546"/>
             <a:chExt cx="8651948" cy="5071769"/>
@@ -8797,23 +8373,14 @@
               </a:pPr>
               <a:r>
                 <a:rPr lang="fr-FR" sz="1200" i="1" dirty="0"/>
-                <a:t>Visualisation direct du projet</a:t>
+                <a:t>Démonstration des modules</a:t>
               </a:r>
             </a:p>
             <a:p>
-              <a:pPr marL="400050" indent="-400050">
-                <a:buAutoNum type="romanUcParenR"/>
-              </a:pPr>
+              <a:endParaRPr lang="fr-FR" sz="1200" i="1" dirty="0"/>
+            </a:p>
+            <a:p>
               <a:endParaRPr lang="fr-FR" sz="1200" dirty="0"/>
-            </a:p>
-            <a:p>
-              <a:pPr marL="400050" indent="-400050">
-                <a:buAutoNum type="romanUcParenR"/>
-              </a:pPr>
-              <a:r>
-                <a:rPr lang="fr-FR" sz="1200" i="1" dirty="0"/>
-                <a:t>Conclusion</a:t>
-              </a:r>
             </a:p>
           </p:txBody>
         </p:sp>

</xml_diff>